<commit_message>
Add new material to WWW
</commit_message>
<xml_diff>
--- a/subjects/WWW/Bazy danych - 1 zajęcia.pptx
+++ b/subjects/WWW/Bazy danych - 1 zajęcia.pptx
@@ -8,7 +8,7 @@
     <p:notesMasterId r:id="rId16"/>
   </p:notesMasterIdLst>
   <p:sldIdLst>
-    <p:sldId id="357" r:id="rId2"/>
+    <p:sldId id="381" r:id="rId2"/>
     <p:sldId id="257" r:id="rId3"/>
     <p:sldId id="267" r:id="rId4"/>
     <p:sldId id="342" r:id="rId5"/>
@@ -128,348 +128,374 @@
 </p:presentation>
 </file>
 
-<file path=ppt/revisionInfo.xml><?xml version="1.0" encoding="utf-8"?>
-<p1510:revInfo xmlns:a="http://schemas.openxmlformats.org/drawingml/2006/main" xmlns:r="http://schemas.openxmlformats.org/officeDocument/2006/relationships" xmlns:p1510="http://schemas.microsoft.com/office/powerpoint/2015/10/main">
-  <p1510:revLst>
-    <p1510:client id="{8BC39906-5D45-435C-BC92-845D1F911E41}" v="5" dt="2024-01-31T08:39:22.780"/>
-  </p1510:revLst>
-</p1510:revInfo>
-</file>
-
 <file path=ppt/changesInfos/changesInfo1.xml><?xml version="1.0" encoding="utf-8"?>
 <pc:chgInfo xmlns:a="http://schemas.openxmlformats.org/drawingml/2006/main" xmlns:r="http://schemas.openxmlformats.org/officeDocument/2006/relationships" xmlns:ac="http://schemas.microsoft.com/office/drawing/2013/main/command" xmlns:pc="http://schemas.microsoft.com/office/powerpoint/2013/main/command">
   <pc:docChgLst>
-    <pc:chgData name="Patryk Serafin" userId="86fa742248e137ce" providerId="LiveId" clId="{87FC6793-3AC2-4670-9288-A890C8C341AB}"/>
-    <pc:docChg chg="delSld">
-      <pc:chgData name="Patryk Serafin" userId="86fa742248e137ce" providerId="LiveId" clId="{87FC6793-3AC2-4670-9288-A890C8C341AB}" dt="2024-01-28T15:16:27.556" v="0" actId="47"/>
+    <pc:chgData name="Patryk Serafin" userId="86fa742248e137ce" providerId="LiveId" clId="{9284F644-453D-4DEE-A2B0-268811375D48}"/>
+    <pc:docChg chg="addSld delSld modSld">
+      <pc:chgData name="Patryk Serafin" userId="86fa742248e137ce" providerId="LiveId" clId="{9284F644-453D-4DEE-A2B0-268811375D48}" dt="2024-01-31T08:39:48.320" v="4" actId="47"/>
       <pc:docMkLst>
         <pc:docMk/>
       </pc:docMkLst>
       <pc:sldChg chg="del">
-        <pc:chgData name="Patryk Serafin" userId="86fa742248e137ce" providerId="LiveId" clId="{87FC6793-3AC2-4670-9288-A890C8C341AB}" dt="2024-01-28T15:16:27.556" v="0" actId="47"/>
-        <pc:sldMkLst>
-          <pc:docMk/>
-          <pc:sldMk cId="3131933903" sldId="271"/>
-        </pc:sldMkLst>
-      </pc:sldChg>
-      <pc:sldChg chg="del">
-        <pc:chgData name="Patryk Serafin" userId="86fa742248e137ce" providerId="LiveId" clId="{87FC6793-3AC2-4670-9288-A890C8C341AB}" dt="2024-01-28T15:16:27.556" v="0" actId="47"/>
-        <pc:sldMkLst>
-          <pc:docMk/>
-          <pc:sldMk cId="2048330268" sldId="273"/>
-        </pc:sldMkLst>
-      </pc:sldChg>
-      <pc:sldChg chg="del">
-        <pc:chgData name="Patryk Serafin" userId="86fa742248e137ce" providerId="LiveId" clId="{87FC6793-3AC2-4670-9288-A890C8C341AB}" dt="2024-01-28T15:16:27.556" v="0" actId="47"/>
-        <pc:sldMkLst>
-          <pc:docMk/>
-          <pc:sldMk cId="1120940816" sldId="274"/>
-        </pc:sldMkLst>
-      </pc:sldChg>
-      <pc:sldChg chg="del">
-        <pc:chgData name="Patryk Serafin" userId="86fa742248e137ce" providerId="LiveId" clId="{87FC6793-3AC2-4670-9288-A890C8C341AB}" dt="2024-01-28T15:16:27.556" v="0" actId="47"/>
-        <pc:sldMkLst>
-          <pc:docMk/>
-          <pc:sldMk cId="2303647636" sldId="276"/>
-        </pc:sldMkLst>
-      </pc:sldChg>
-      <pc:sldChg chg="del">
-        <pc:chgData name="Patryk Serafin" userId="86fa742248e137ce" providerId="LiveId" clId="{87FC6793-3AC2-4670-9288-A890C8C341AB}" dt="2024-01-28T15:16:27.556" v="0" actId="47"/>
-        <pc:sldMkLst>
-          <pc:docMk/>
-          <pc:sldMk cId="256880835" sldId="277"/>
-        </pc:sldMkLst>
-      </pc:sldChg>
-      <pc:sldChg chg="del">
-        <pc:chgData name="Patryk Serafin" userId="86fa742248e137ce" providerId="LiveId" clId="{87FC6793-3AC2-4670-9288-A890C8C341AB}" dt="2024-01-28T15:16:27.556" v="0" actId="47"/>
-        <pc:sldMkLst>
-          <pc:docMk/>
-          <pc:sldMk cId="1532553888" sldId="279"/>
-        </pc:sldMkLst>
-      </pc:sldChg>
-      <pc:sldChg chg="del">
-        <pc:chgData name="Patryk Serafin" userId="86fa742248e137ce" providerId="LiveId" clId="{87FC6793-3AC2-4670-9288-A890C8C341AB}" dt="2024-01-28T15:16:27.556" v="0" actId="47"/>
-        <pc:sldMkLst>
-          <pc:docMk/>
-          <pc:sldMk cId="2285479768" sldId="281"/>
-        </pc:sldMkLst>
-      </pc:sldChg>
-      <pc:sldChg chg="del">
-        <pc:chgData name="Patryk Serafin" userId="86fa742248e137ce" providerId="LiveId" clId="{87FC6793-3AC2-4670-9288-A890C8C341AB}" dt="2024-01-28T15:16:27.556" v="0" actId="47"/>
-        <pc:sldMkLst>
-          <pc:docMk/>
-          <pc:sldMk cId="1193503798" sldId="284"/>
-        </pc:sldMkLst>
-      </pc:sldChg>
-      <pc:sldChg chg="del">
-        <pc:chgData name="Patryk Serafin" userId="86fa742248e137ce" providerId="LiveId" clId="{87FC6793-3AC2-4670-9288-A890C8C341AB}" dt="2024-01-28T15:16:27.556" v="0" actId="47"/>
-        <pc:sldMkLst>
-          <pc:docMk/>
-          <pc:sldMk cId="522012961" sldId="285"/>
-        </pc:sldMkLst>
-      </pc:sldChg>
-      <pc:sldChg chg="del">
-        <pc:chgData name="Patryk Serafin" userId="86fa742248e137ce" providerId="LiveId" clId="{87FC6793-3AC2-4670-9288-A890C8C341AB}" dt="2024-01-28T15:16:27.556" v="0" actId="47"/>
-        <pc:sldMkLst>
-          <pc:docMk/>
-          <pc:sldMk cId="188700031" sldId="286"/>
-        </pc:sldMkLst>
-      </pc:sldChg>
-      <pc:sldChg chg="del">
-        <pc:chgData name="Patryk Serafin" userId="86fa742248e137ce" providerId="LiveId" clId="{87FC6793-3AC2-4670-9288-A890C8C341AB}" dt="2024-01-28T15:16:27.556" v="0" actId="47"/>
-        <pc:sldMkLst>
-          <pc:docMk/>
-          <pc:sldMk cId="4247694359" sldId="287"/>
-        </pc:sldMkLst>
-      </pc:sldChg>
-      <pc:sldChg chg="del">
-        <pc:chgData name="Patryk Serafin" userId="86fa742248e137ce" providerId="LiveId" clId="{87FC6793-3AC2-4670-9288-A890C8C341AB}" dt="2024-01-28T15:16:27.556" v="0" actId="47"/>
-        <pc:sldMkLst>
-          <pc:docMk/>
-          <pc:sldMk cId="848335432" sldId="288"/>
-        </pc:sldMkLst>
-      </pc:sldChg>
-      <pc:sldChg chg="del">
-        <pc:chgData name="Patryk Serafin" userId="86fa742248e137ce" providerId="LiveId" clId="{87FC6793-3AC2-4670-9288-A890C8C341AB}" dt="2024-01-28T15:16:27.556" v="0" actId="47"/>
-        <pc:sldMkLst>
-          <pc:docMk/>
-          <pc:sldMk cId="2066349234" sldId="289"/>
-        </pc:sldMkLst>
-      </pc:sldChg>
-      <pc:sldChg chg="del">
-        <pc:chgData name="Patryk Serafin" userId="86fa742248e137ce" providerId="LiveId" clId="{87FC6793-3AC2-4670-9288-A890C8C341AB}" dt="2024-01-28T15:16:27.556" v="0" actId="47"/>
-        <pc:sldMkLst>
-          <pc:docMk/>
-          <pc:sldMk cId="3115832531" sldId="291"/>
-        </pc:sldMkLst>
-      </pc:sldChg>
-      <pc:sldChg chg="del">
-        <pc:chgData name="Patryk Serafin" userId="86fa742248e137ce" providerId="LiveId" clId="{87FC6793-3AC2-4670-9288-A890C8C341AB}" dt="2024-01-28T15:16:27.556" v="0" actId="47"/>
-        <pc:sldMkLst>
-          <pc:docMk/>
-          <pc:sldMk cId="1777602640" sldId="292"/>
-        </pc:sldMkLst>
-      </pc:sldChg>
-      <pc:sldChg chg="del">
-        <pc:chgData name="Patryk Serafin" userId="86fa742248e137ce" providerId="LiveId" clId="{87FC6793-3AC2-4670-9288-A890C8C341AB}" dt="2024-01-28T15:16:27.556" v="0" actId="47"/>
-        <pc:sldMkLst>
-          <pc:docMk/>
-          <pc:sldMk cId="64165896" sldId="293"/>
-        </pc:sldMkLst>
-      </pc:sldChg>
-      <pc:sldChg chg="del">
-        <pc:chgData name="Patryk Serafin" userId="86fa742248e137ce" providerId="LiveId" clId="{87FC6793-3AC2-4670-9288-A890C8C341AB}" dt="2024-01-28T15:16:27.556" v="0" actId="47"/>
-        <pc:sldMkLst>
-          <pc:docMk/>
-          <pc:sldMk cId="1539200991" sldId="294"/>
-        </pc:sldMkLst>
-      </pc:sldChg>
-      <pc:sldChg chg="del">
-        <pc:chgData name="Patryk Serafin" userId="86fa742248e137ce" providerId="LiveId" clId="{87FC6793-3AC2-4670-9288-A890C8C341AB}" dt="2024-01-28T15:16:27.556" v="0" actId="47"/>
-        <pc:sldMkLst>
-          <pc:docMk/>
-          <pc:sldMk cId="2488230557" sldId="295"/>
-        </pc:sldMkLst>
-      </pc:sldChg>
-      <pc:sldChg chg="del">
-        <pc:chgData name="Patryk Serafin" userId="86fa742248e137ce" providerId="LiveId" clId="{87FC6793-3AC2-4670-9288-A890C8C341AB}" dt="2024-01-28T15:16:27.556" v="0" actId="47"/>
-        <pc:sldMkLst>
-          <pc:docMk/>
-          <pc:sldMk cId="1490490431" sldId="296"/>
-        </pc:sldMkLst>
-      </pc:sldChg>
-      <pc:sldChg chg="del">
-        <pc:chgData name="Patryk Serafin" userId="86fa742248e137ce" providerId="LiveId" clId="{87FC6793-3AC2-4670-9288-A890C8C341AB}" dt="2024-01-28T15:16:27.556" v="0" actId="47"/>
-        <pc:sldMkLst>
-          <pc:docMk/>
-          <pc:sldMk cId="1395509342" sldId="297"/>
-        </pc:sldMkLst>
-      </pc:sldChg>
-      <pc:sldChg chg="del">
-        <pc:chgData name="Patryk Serafin" userId="86fa742248e137ce" providerId="LiveId" clId="{87FC6793-3AC2-4670-9288-A890C8C341AB}" dt="2024-01-28T15:16:27.556" v="0" actId="47"/>
-        <pc:sldMkLst>
-          <pc:docMk/>
-          <pc:sldMk cId="2607788598" sldId="298"/>
-        </pc:sldMkLst>
-      </pc:sldChg>
-      <pc:sldChg chg="del">
-        <pc:chgData name="Patryk Serafin" userId="86fa742248e137ce" providerId="LiveId" clId="{87FC6793-3AC2-4670-9288-A890C8C341AB}" dt="2024-01-28T15:16:27.556" v="0" actId="47"/>
-        <pc:sldMkLst>
-          <pc:docMk/>
-          <pc:sldMk cId="80568656" sldId="299"/>
-        </pc:sldMkLst>
-      </pc:sldChg>
-      <pc:sldChg chg="del">
-        <pc:chgData name="Patryk Serafin" userId="86fa742248e137ce" providerId="LiveId" clId="{87FC6793-3AC2-4670-9288-A890C8C341AB}" dt="2024-01-28T15:16:27.556" v="0" actId="47"/>
-        <pc:sldMkLst>
-          <pc:docMk/>
-          <pc:sldMk cId="78985000" sldId="300"/>
-        </pc:sldMkLst>
-      </pc:sldChg>
-      <pc:sldChg chg="del">
-        <pc:chgData name="Patryk Serafin" userId="86fa742248e137ce" providerId="LiveId" clId="{87FC6793-3AC2-4670-9288-A890C8C341AB}" dt="2024-01-28T15:16:27.556" v="0" actId="47"/>
-        <pc:sldMkLst>
-          <pc:docMk/>
-          <pc:sldMk cId="758177806" sldId="301"/>
-        </pc:sldMkLst>
-      </pc:sldChg>
-      <pc:sldChg chg="del">
-        <pc:chgData name="Patryk Serafin" userId="86fa742248e137ce" providerId="LiveId" clId="{87FC6793-3AC2-4670-9288-A890C8C341AB}" dt="2024-01-28T15:16:27.556" v="0" actId="47"/>
-        <pc:sldMkLst>
-          <pc:docMk/>
-          <pc:sldMk cId="2199598623" sldId="302"/>
-        </pc:sldMkLst>
-      </pc:sldChg>
-      <pc:sldChg chg="del">
-        <pc:chgData name="Patryk Serafin" userId="86fa742248e137ce" providerId="LiveId" clId="{87FC6793-3AC2-4670-9288-A890C8C341AB}" dt="2024-01-28T15:16:27.556" v="0" actId="47"/>
-        <pc:sldMkLst>
-          <pc:docMk/>
-          <pc:sldMk cId="2922012136" sldId="303"/>
-        </pc:sldMkLst>
-      </pc:sldChg>
-      <pc:sldChg chg="del">
-        <pc:chgData name="Patryk Serafin" userId="86fa742248e137ce" providerId="LiveId" clId="{87FC6793-3AC2-4670-9288-A890C8C341AB}" dt="2024-01-28T15:16:27.556" v="0" actId="47"/>
-        <pc:sldMkLst>
-          <pc:docMk/>
-          <pc:sldMk cId="3067300260" sldId="328"/>
-        </pc:sldMkLst>
-      </pc:sldChg>
-      <pc:sldChg chg="del">
-        <pc:chgData name="Patryk Serafin" userId="86fa742248e137ce" providerId="LiveId" clId="{87FC6793-3AC2-4670-9288-A890C8C341AB}" dt="2024-01-28T15:16:27.556" v="0" actId="47"/>
-        <pc:sldMkLst>
-          <pc:docMk/>
-          <pc:sldMk cId="3105423532" sldId="329"/>
-        </pc:sldMkLst>
-      </pc:sldChg>
-      <pc:sldChg chg="del">
-        <pc:chgData name="Patryk Serafin" userId="86fa742248e137ce" providerId="LiveId" clId="{87FC6793-3AC2-4670-9288-A890C8C341AB}" dt="2024-01-28T15:16:27.556" v="0" actId="47"/>
-        <pc:sldMkLst>
-          <pc:docMk/>
-          <pc:sldMk cId="2953213920" sldId="330"/>
-        </pc:sldMkLst>
-      </pc:sldChg>
-      <pc:sldChg chg="del">
-        <pc:chgData name="Patryk Serafin" userId="86fa742248e137ce" providerId="LiveId" clId="{87FC6793-3AC2-4670-9288-A890C8C341AB}" dt="2024-01-28T15:16:27.556" v="0" actId="47"/>
-        <pc:sldMkLst>
-          <pc:docMk/>
-          <pc:sldMk cId="3451375755" sldId="331"/>
-        </pc:sldMkLst>
-      </pc:sldChg>
-      <pc:sldChg chg="del">
-        <pc:chgData name="Patryk Serafin" userId="86fa742248e137ce" providerId="LiveId" clId="{87FC6793-3AC2-4670-9288-A890C8C341AB}" dt="2024-01-28T15:16:27.556" v="0" actId="47"/>
-        <pc:sldMkLst>
-          <pc:docMk/>
-          <pc:sldMk cId="3103524922" sldId="332"/>
-        </pc:sldMkLst>
-      </pc:sldChg>
-      <pc:sldChg chg="del">
-        <pc:chgData name="Patryk Serafin" userId="86fa742248e137ce" providerId="LiveId" clId="{87FC6793-3AC2-4670-9288-A890C8C341AB}" dt="2024-01-28T15:16:27.556" v="0" actId="47"/>
-        <pc:sldMkLst>
-          <pc:docMk/>
-          <pc:sldMk cId="1164664569" sldId="333"/>
-        </pc:sldMkLst>
-      </pc:sldChg>
-      <pc:sldChg chg="del">
-        <pc:chgData name="Patryk Serafin" userId="86fa742248e137ce" providerId="LiveId" clId="{87FC6793-3AC2-4670-9288-A890C8C341AB}" dt="2024-01-28T15:16:27.556" v="0" actId="47"/>
-        <pc:sldMkLst>
-          <pc:docMk/>
-          <pc:sldMk cId="1240097952" sldId="334"/>
-        </pc:sldMkLst>
-      </pc:sldChg>
-      <pc:sldChg chg="del">
-        <pc:chgData name="Patryk Serafin" userId="86fa742248e137ce" providerId="LiveId" clId="{87FC6793-3AC2-4670-9288-A890C8C341AB}" dt="2024-01-28T15:16:27.556" v="0" actId="47"/>
-        <pc:sldMkLst>
-          <pc:docMk/>
-          <pc:sldMk cId="3792520985" sldId="335"/>
-        </pc:sldMkLst>
-      </pc:sldChg>
-      <pc:sldChg chg="del">
-        <pc:chgData name="Patryk Serafin" userId="86fa742248e137ce" providerId="LiveId" clId="{87FC6793-3AC2-4670-9288-A890C8C341AB}" dt="2024-01-28T15:16:27.556" v="0" actId="47"/>
-        <pc:sldMkLst>
-          <pc:docMk/>
-          <pc:sldMk cId="1419307233" sldId="336"/>
-        </pc:sldMkLst>
-      </pc:sldChg>
-      <pc:sldChg chg="del">
-        <pc:chgData name="Patryk Serafin" userId="86fa742248e137ce" providerId="LiveId" clId="{87FC6793-3AC2-4670-9288-A890C8C341AB}" dt="2024-01-28T15:16:27.556" v="0" actId="47"/>
-        <pc:sldMkLst>
-          <pc:docMk/>
-          <pc:sldMk cId="3561373349" sldId="337"/>
-        </pc:sldMkLst>
-      </pc:sldChg>
-      <pc:sldChg chg="del">
-        <pc:chgData name="Patryk Serafin" userId="86fa742248e137ce" providerId="LiveId" clId="{87FC6793-3AC2-4670-9288-A890C8C341AB}" dt="2024-01-28T15:16:27.556" v="0" actId="47"/>
-        <pc:sldMkLst>
-          <pc:docMk/>
-          <pc:sldMk cId="3461106496" sldId="338"/>
-        </pc:sldMkLst>
-      </pc:sldChg>
-      <pc:sldChg chg="del">
-        <pc:chgData name="Patryk Serafin" userId="86fa742248e137ce" providerId="LiveId" clId="{87FC6793-3AC2-4670-9288-A890C8C341AB}" dt="2024-01-28T15:16:27.556" v="0" actId="47"/>
-        <pc:sldMkLst>
-          <pc:docMk/>
-          <pc:sldMk cId="2549208066" sldId="339"/>
-        </pc:sldMkLst>
-      </pc:sldChg>
-      <pc:sldChg chg="del">
-        <pc:chgData name="Patryk Serafin" userId="86fa742248e137ce" providerId="LiveId" clId="{87FC6793-3AC2-4670-9288-A890C8C341AB}" dt="2024-01-28T15:16:27.556" v="0" actId="47"/>
-        <pc:sldMkLst>
-          <pc:docMk/>
-          <pc:sldMk cId="4007445916" sldId="340"/>
-        </pc:sldMkLst>
+        <pc:chgData name="Patryk Serafin" userId="86fa742248e137ce" providerId="LiveId" clId="{9284F644-453D-4DEE-A2B0-268811375D48}" dt="2024-01-31T08:39:48.320" v="4" actId="47"/>
+        <pc:sldMkLst>
+          <pc:docMk/>
+          <pc:sldMk cId="2421352655" sldId="256"/>
+        </pc:sldMkLst>
+      </pc:sldChg>
+      <pc:sldChg chg="add">
+        <pc:chgData name="Patryk Serafin" userId="86fa742248e137ce" providerId="LiveId" clId="{9284F644-453D-4DEE-A2B0-268811375D48}" dt="2024-01-31T08:39:46.694" v="3"/>
+        <pc:sldMkLst>
+          <pc:docMk/>
+          <pc:sldMk cId="1578271858" sldId="381"/>
+        </pc:sldMkLst>
+      </pc:sldChg>
+      <pc:sldChg chg="addSp delSp add del setBg delDesignElem">
+        <pc:chgData name="Patryk Serafin" userId="86fa742248e137ce" providerId="LiveId" clId="{9284F644-453D-4DEE-A2B0-268811375D48}" dt="2024-01-31T08:39:46.679" v="2"/>
+        <pc:sldMkLst>
+          <pc:docMk/>
+          <pc:sldMk cId="2107130423" sldId="381"/>
+        </pc:sldMkLst>
+        <pc:spChg chg="add del">
+          <ac:chgData name="Patryk Serafin" userId="86fa742248e137ce" providerId="LiveId" clId="{9284F644-453D-4DEE-A2B0-268811375D48}" dt="2024-01-31T08:39:46.679" v="2"/>
+          <ac:spMkLst>
+            <pc:docMk/>
+            <pc:sldMk cId="2107130423" sldId="381"/>
+            <ac:spMk id="36" creationId="{7A875D55-4A80-43E9-38F6-27E3664939B0}"/>
+          </ac:spMkLst>
+        </pc:spChg>
+        <pc:spChg chg="add del">
+          <ac:chgData name="Patryk Serafin" userId="86fa742248e137ce" providerId="LiveId" clId="{9284F644-453D-4DEE-A2B0-268811375D48}" dt="2024-01-31T08:39:46.679" v="2"/>
+          <ac:spMkLst>
+            <pc:docMk/>
+            <pc:sldMk cId="2107130423" sldId="381"/>
+            <ac:spMk id="38" creationId="{3D572980-FB84-8C29-1FAC-FAC5ECE29A39}"/>
+          </ac:spMkLst>
+        </pc:spChg>
       </pc:sldChg>
     </pc:docChg>
   </pc:docChgLst>
   <pc:docChgLst>
-    <pc:chgData name="Patryk Serafin" userId="86fa742248e137ce" providerId="LiveId" clId="{8BC39906-5D45-435C-BC92-845D1F911E41}"/>
-    <pc:docChg chg="undo custSel addSld delSld modSld">
-      <pc:chgData name="Patryk Serafin" userId="86fa742248e137ce" providerId="LiveId" clId="{8BC39906-5D45-435C-BC92-845D1F911E41}" dt="2024-01-31T08:39:25.276" v="69" actId="47"/>
+    <pc:chgData name="Patryk Serafin" userId="86fa742248e137ce" providerId="LiveId" clId="{339EAE9B-F713-4D08-858A-8BD130048AC7}"/>
+    <pc:docChg chg="delSld">
+      <pc:chgData name="Patryk Serafin" userId="86fa742248e137ce" providerId="LiveId" clId="{339EAE9B-F713-4D08-858A-8BD130048AC7}" dt="2024-02-04T12:49:23.435" v="0" actId="47"/>
       <pc:docMkLst>
         <pc:docMk/>
       </pc:docMkLst>
-      <pc:sldChg chg="modSp del mod">
-        <pc:chgData name="Patryk Serafin" userId="86fa742248e137ce" providerId="LiveId" clId="{8BC39906-5D45-435C-BC92-845D1F911E41}" dt="2024-01-31T08:39:25.276" v="69" actId="47"/>
-        <pc:sldMkLst>
-          <pc:docMk/>
-          <pc:sldMk cId="2421352655" sldId="256"/>
-        </pc:sldMkLst>
-        <pc:spChg chg="mod">
-          <ac:chgData name="Patryk Serafin" userId="86fa742248e137ce" providerId="LiveId" clId="{8BC39906-5D45-435C-BC92-845D1F911E41}" dt="2024-01-31T08:38:17.026" v="64" actId="20577"/>
-          <ac:spMkLst>
-            <pc:docMk/>
-            <pc:sldMk cId="2421352655" sldId="256"/>
-            <ac:spMk id="3" creationId="{F092CA79-CC0B-23E4-AB82-87274587D9EC}"/>
-          </ac:spMkLst>
-        </pc:spChg>
-      </pc:sldChg>
-      <pc:sldChg chg="addSp delSp add del setBg delDesignElem">
-        <pc:chgData name="Patryk Serafin" userId="86fa742248e137ce" providerId="LiveId" clId="{8BC39906-5D45-435C-BC92-845D1F911E41}" dt="2024-01-31T08:39:22.765" v="67"/>
-        <pc:sldMkLst>
-          <pc:docMk/>
-          <pc:sldMk cId="902909899" sldId="357"/>
-        </pc:sldMkLst>
-        <pc:spChg chg="add del">
-          <ac:chgData name="Patryk Serafin" userId="86fa742248e137ce" providerId="LiveId" clId="{8BC39906-5D45-435C-BC92-845D1F911E41}" dt="2024-01-31T08:39:22.765" v="67"/>
-          <ac:spMkLst>
-            <pc:docMk/>
-            <pc:sldMk cId="902909899" sldId="357"/>
-            <ac:spMk id="36" creationId="{7A875D55-4A80-43E9-38F6-27E3664939B0}"/>
-          </ac:spMkLst>
-        </pc:spChg>
-        <pc:spChg chg="add del">
-          <ac:chgData name="Patryk Serafin" userId="86fa742248e137ce" providerId="LiveId" clId="{8BC39906-5D45-435C-BC92-845D1F911E41}" dt="2024-01-31T08:39:22.765" v="67"/>
-          <ac:spMkLst>
-            <pc:docMk/>
-            <pc:sldMk cId="902909899" sldId="357"/>
-            <ac:spMk id="38" creationId="{3D572980-FB84-8C29-1FAC-FAC5ECE29A39}"/>
-          </ac:spMkLst>
-        </pc:spChg>
-      </pc:sldChg>
-      <pc:sldChg chg="add">
-        <pc:chgData name="Patryk Serafin" userId="86fa742248e137ce" providerId="LiveId" clId="{8BC39906-5D45-435C-BC92-845D1F911E41}" dt="2024-01-31T08:39:22.780" v="68"/>
-        <pc:sldMkLst>
-          <pc:docMk/>
-          <pc:sldMk cId="1535528987" sldId="357"/>
+      <pc:sldChg chg="del">
+        <pc:chgData name="Patryk Serafin" userId="86fa742248e137ce" providerId="LiveId" clId="{339EAE9B-F713-4D08-858A-8BD130048AC7}" dt="2024-02-04T12:49:23.435" v="0" actId="47"/>
+        <pc:sldMkLst>
+          <pc:docMk/>
+          <pc:sldMk cId="2285479768" sldId="281"/>
+        </pc:sldMkLst>
+      </pc:sldChg>
+      <pc:sldChg chg="del">
+        <pc:chgData name="Patryk Serafin" userId="86fa742248e137ce" providerId="LiveId" clId="{339EAE9B-F713-4D08-858A-8BD130048AC7}" dt="2024-02-04T12:49:23.435" v="0" actId="47"/>
+        <pc:sldMkLst>
+          <pc:docMk/>
+          <pc:sldMk cId="1193503798" sldId="284"/>
+        </pc:sldMkLst>
+      </pc:sldChg>
+      <pc:sldChg chg="del">
+        <pc:chgData name="Patryk Serafin" userId="86fa742248e137ce" providerId="LiveId" clId="{339EAE9B-F713-4D08-858A-8BD130048AC7}" dt="2024-02-04T12:49:23.435" v="0" actId="47"/>
+        <pc:sldMkLst>
+          <pc:docMk/>
+          <pc:sldMk cId="522012961" sldId="285"/>
+        </pc:sldMkLst>
+      </pc:sldChg>
+      <pc:sldChg chg="del">
+        <pc:chgData name="Patryk Serafin" userId="86fa742248e137ce" providerId="LiveId" clId="{339EAE9B-F713-4D08-858A-8BD130048AC7}" dt="2024-02-04T12:49:23.435" v="0" actId="47"/>
+        <pc:sldMkLst>
+          <pc:docMk/>
+          <pc:sldMk cId="188700031" sldId="286"/>
+        </pc:sldMkLst>
+      </pc:sldChg>
+      <pc:sldChg chg="del">
+        <pc:chgData name="Patryk Serafin" userId="86fa742248e137ce" providerId="LiveId" clId="{339EAE9B-F713-4D08-858A-8BD130048AC7}" dt="2024-02-04T12:49:23.435" v="0" actId="47"/>
+        <pc:sldMkLst>
+          <pc:docMk/>
+          <pc:sldMk cId="4247694359" sldId="287"/>
+        </pc:sldMkLst>
+      </pc:sldChg>
+      <pc:sldChg chg="del">
+        <pc:chgData name="Patryk Serafin" userId="86fa742248e137ce" providerId="LiveId" clId="{339EAE9B-F713-4D08-858A-8BD130048AC7}" dt="2024-02-04T12:49:23.435" v="0" actId="47"/>
+        <pc:sldMkLst>
+          <pc:docMk/>
+          <pc:sldMk cId="848335432" sldId="288"/>
+        </pc:sldMkLst>
+      </pc:sldChg>
+      <pc:sldChg chg="del">
+        <pc:chgData name="Patryk Serafin" userId="86fa742248e137ce" providerId="LiveId" clId="{339EAE9B-F713-4D08-858A-8BD130048AC7}" dt="2024-02-04T12:49:23.435" v="0" actId="47"/>
+        <pc:sldMkLst>
+          <pc:docMk/>
+          <pc:sldMk cId="2066349234" sldId="289"/>
+        </pc:sldMkLst>
+      </pc:sldChg>
+      <pc:sldChg chg="del">
+        <pc:chgData name="Patryk Serafin" userId="86fa742248e137ce" providerId="LiveId" clId="{339EAE9B-F713-4D08-858A-8BD130048AC7}" dt="2024-02-04T12:49:23.435" v="0" actId="47"/>
+        <pc:sldMkLst>
+          <pc:docMk/>
+          <pc:sldMk cId="3115832531" sldId="291"/>
+        </pc:sldMkLst>
+      </pc:sldChg>
+      <pc:sldChg chg="del">
+        <pc:chgData name="Patryk Serafin" userId="86fa742248e137ce" providerId="LiveId" clId="{339EAE9B-F713-4D08-858A-8BD130048AC7}" dt="2024-02-04T12:49:23.435" v="0" actId="47"/>
+        <pc:sldMkLst>
+          <pc:docMk/>
+          <pc:sldMk cId="1777602640" sldId="292"/>
+        </pc:sldMkLst>
+      </pc:sldChg>
+      <pc:sldChg chg="del">
+        <pc:chgData name="Patryk Serafin" userId="86fa742248e137ce" providerId="LiveId" clId="{339EAE9B-F713-4D08-858A-8BD130048AC7}" dt="2024-02-04T12:49:23.435" v="0" actId="47"/>
+        <pc:sldMkLst>
+          <pc:docMk/>
+          <pc:sldMk cId="64165896" sldId="293"/>
+        </pc:sldMkLst>
+      </pc:sldChg>
+      <pc:sldChg chg="del">
+        <pc:chgData name="Patryk Serafin" userId="86fa742248e137ce" providerId="LiveId" clId="{339EAE9B-F713-4D08-858A-8BD130048AC7}" dt="2024-02-04T12:49:23.435" v="0" actId="47"/>
+        <pc:sldMkLst>
+          <pc:docMk/>
+          <pc:sldMk cId="1539200991" sldId="294"/>
+        </pc:sldMkLst>
+      </pc:sldChg>
+      <pc:sldChg chg="del">
+        <pc:chgData name="Patryk Serafin" userId="86fa742248e137ce" providerId="LiveId" clId="{339EAE9B-F713-4D08-858A-8BD130048AC7}" dt="2024-02-04T12:49:23.435" v="0" actId="47"/>
+        <pc:sldMkLst>
+          <pc:docMk/>
+          <pc:sldMk cId="2488230557" sldId="295"/>
+        </pc:sldMkLst>
+      </pc:sldChg>
+      <pc:sldChg chg="del">
+        <pc:chgData name="Patryk Serafin" userId="86fa742248e137ce" providerId="LiveId" clId="{339EAE9B-F713-4D08-858A-8BD130048AC7}" dt="2024-02-04T12:49:23.435" v="0" actId="47"/>
+        <pc:sldMkLst>
+          <pc:docMk/>
+          <pc:sldMk cId="1490490431" sldId="296"/>
+        </pc:sldMkLst>
+      </pc:sldChg>
+      <pc:sldChg chg="del">
+        <pc:chgData name="Patryk Serafin" userId="86fa742248e137ce" providerId="LiveId" clId="{339EAE9B-F713-4D08-858A-8BD130048AC7}" dt="2024-02-04T12:49:23.435" v="0" actId="47"/>
+        <pc:sldMkLst>
+          <pc:docMk/>
+          <pc:sldMk cId="1395509342" sldId="297"/>
+        </pc:sldMkLst>
+      </pc:sldChg>
+      <pc:sldChg chg="del">
+        <pc:chgData name="Patryk Serafin" userId="86fa742248e137ce" providerId="LiveId" clId="{339EAE9B-F713-4D08-858A-8BD130048AC7}" dt="2024-02-04T12:49:23.435" v="0" actId="47"/>
+        <pc:sldMkLst>
+          <pc:docMk/>
+          <pc:sldMk cId="2607788598" sldId="298"/>
+        </pc:sldMkLst>
+      </pc:sldChg>
+      <pc:sldChg chg="del">
+        <pc:chgData name="Patryk Serafin" userId="86fa742248e137ce" providerId="LiveId" clId="{339EAE9B-F713-4D08-858A-8BD130048AC7}" dt="2024-02-04T12:49:23.435" v="0" actId="47"/>
+        <pc:sldMkLst>
+          <pc:docMk/>
+          <pc:sldMk cId="80568656" sldId="299"/>
+        </pc:sldMkLst>
+      </pc:sldChg>
+      <pc:sldChg chg="del">
+        <pc:chgData name="Patryk Serafin" userId="86fa742248e137ce" providerId="LiveId" clId="{339EAE9B-F713-4D08-858A-8BD130048AC7}" dt="2024-02-04T12:49:23.435" v="0" actId="47"/>
+        <pc:sldMkLst>
+          <pc:docMk/>
+          <pc:sldMk cId="78985000" sldId="300"/>
+        </pc:sldMkLst>
+      </pc:sldChg>
+      <pc:sldChg chg="del">
+        <pc:chgData name="Patryk Serafin" userId="86fa742248e137ce" providerId="LiveId" clId="{339EAE9B-F713-4D08-858A-8BD130048AC7}" dt="2024-02-04T12:49:23.435" v="0" actId="47"/>
+        <pc:sldMkLst>
+          <pc:docMk/>
+          <pc:sldMk cId="758177806" sldId="301"/>
+        </pc:sldMkLst>
+      </pc:sldChg>
+      <pc:sldChg chg="del">
+        <pc:chgData name="Patryk Serafin" userId="86fa742248e137ce" providerId="LiveId" clId="{339EAE9B-F713-4D08-858A-8BD130048AC7}" dt="2024-02-04T12:49:23.435" v="0" actId="47"/>
+        <pc:sldMkLst>
+          <pc:docMk/>
+          <pc:sldMk cId="2199598623" sldId="302"/>
+        </pc:sldMkLst>
+      </pc:sldChg>
+      <pc:sldChg chg="del">
+        <pc:chgData name="Patryk Serafin" userId="86fa742248e137ce" providerId="LiveId" clId="{339EAE9B-F713-4D08-858A-8BD130048AC7}" dt="2024-02-04T12:49:23.435" v="0" actId="47"/>
+        <pc:sldMkLst>
+          <pc:docMk/>
+          <pc:sldMk cId="2922012136" sldId="303"/>
+        </pc:sldMkLst>
+      </pc:sldChg>
+      <pc:sldChg chg="del">
+        <pc:chgData name="Patryk Serafin" userId="86fa742248e137ce" providerId="LiveId" clId="{339EAE9B-F713-4D08-858A-8BD130048AC7}" dt="2024-02-04T12:49:23.435" v="0" actId="47"/>
+        <pc:sldMkLst>
+          <pc:docMk/>
+          <pc:sldMk cId="3067300260" sldId="328"/>
+        </pc:sldMkLst>
+      </pc:sldChg>
+      <pc:sldChg chg="del">
+        <pc:chgData name="Patryk Serafin" userId="86fa742248e137ce" providerId="LiveId" clId="{339EAE9B-F713-4D08-858A-8BD130048AC7}" dt="2024-02-04T12:49:23.435" v="0" actId="47"/>
+        <pc:sldMkLst>
+          <pc:docMk/>
+          <pc:sldMk cId="3105423532" sldId="329"/>
+        </pc:sldMkLst>
+      </pc:sldChg>
+      <pc:sldChg chg="del">
+        <pc:chgData name="Patryk Serafin" userId="86fa742248e137ce" providerId="LiveId" clId="{339EAE9B-F713-4D08-858A-8BD130048AC7}" dt="2024-02-04T12:49:23.435" v="0" actId="47"/>
+        <pc:sldMkLst>
+          <pc:docMk/>
+          <pc:sldMk cId="2953213920" sldId="330"/>
+        </pc:sldMkLst>
+      </pc:sldChg>
+      <pc:sldChg chg="del">
+        <pc:chgData name="Patryk Serafin" userId="86fa742248e137ce" providerId="LiveId" clId="{339EAE9B-F713-4D08-858A-8BD130048AC7}" dt="2024-02-04T12:49:23.435" v="0" actId="47"/>
+        <pc:sldMkLst>
+          <pc:docMk/>
+          <pc:sldMk cId="3451375755" sldId="331"/>
+        </pc:sldMkLst>
+      </pc:sldChg>
+      <pc:sldChg chg="del">
+        <pc:chgData name="Patryk Serafin" userId="86fa742248e137ce" providerId="LiveId" clId="{339EAE9B-F713-4D08-858A-8BD130048AC7}" dt="2024-02-04T12:49:23.435" v="0" actId="47"/>
+        <pc:sldMkLst>
+          <pc:docMk/>
+          <pc:sldMk cId="3103524922" sldId="332"/>
+        </pc:sldMkLst>
+      </pc:sldChg>
+      <pc:sldChg chg="del">
+        <pc:chgData name="Patryk Serafin" userId="86fa742248e137ce" providerId="LiveId" clId="{339EAE9B-F713-4D08-858A-8BD130048AC7}" dt="2024-02-04T12:49:23.435" v="0" actId="47"/>
+        <pc:sldMkLst>
+          <pc:docMk/>
+          <pc:sldMk cId="1164664569" sldId="333"/>
+        </pc:sldMkLst>
+      </pc:sldChg>
+      <pc:sldChg chg="del">
+        <pc:chgData name="Patryk Serafin" userId="86fa742248e137ce" providerId="LiveId" clId="{339EAE9B-F713-4D08-858A-8BD130048AC7}" dt="2024-02-04T12:49:23.435" v="0" actId="47"/>
+        <pc:sldMkLst>
+          <pc:docMk/>
+          <pc:sldMk cId="1240097952" sldId="334"/>
+        </pc:sldMkLst>
+      </pc:sldChg>
+      <pc:sldChg chg="del">
+        <pc:chgData name="Patryk Serafin" userId="86fa742248e137ce" providerId="LiveId" clId="{339EAE9B-F713-4D08-858A-8BD130048AC7}" dt="2024-02-04T12:49:23.435" v="0" actId="47"/>
+        <pc:sldMkLst>
+          <pc:docMk/>
+          <pc:sldMk cId="3792520985" sldId="335"/>
+        </pc:sldMkLst>
+      </pc:sldChg>
+      <pc:sldChg chg="del">
+        <pc:chgData name="Patryk Serafin" userId="86fa742248e137ce" providerId="LiveId" clId="{339EAE9B-F713-4D08-858A-8BD130048AC7}" dt="2024-02-04T12:49:23.435" v="0" actId="47"/>
+        <pc:sldMkLst>
+          <pc:docMk/>
+          <pc:sldMk cId="1419307233" sldId="336"/>
+        </pc:sldMkLst>
+      </pc:sldChg>
+      <pc:sldChg chg="del">
+        <pc:chgData name="Patryk Serafin" userId="86fa742248e137ce" providerId="LiveId" clId="{339EAE9B-F713-4D08-858A-8BD130048AC7}" dt="2024-02-04T12:49:23.435" v="0" actId="47"/>
+        <pc:sldMkLst>
+          <pc:docMk/>
+          <pc:sldMk cId="3561373349" sldId="337"/>
+        </pc:sldMkLst>
+      </pc:sldChg>
+      <pc:sldChg chg="del">
+        <pc:chgData name="Patryk Serafin" userId="86fa742248e137ce" providerId="LiveId" clId="{339EAE9B-F713-4D08-858A-8BD130048AC7}" dt="2024-02-04T12:49:23.435" v="0" actId="47"/>
+        <pc:sldMkLst>
+          <pc:docMk/>
+          <pc:sldMk cId="3461106496" sldId="338"/>
+        </pc:sldMkLst>
+      </pc:sldChg>
+      <pc:sldChg chg="del">
+        <pc:chgData name="Patryk Serafin" userId="86fa742248e137ce" providerId="LiveId" clId="{339EAE9B-F713-4D08-858A-8BD130048AC7}" dt="2024-02-04T12:49:23.435" v="0" actId="47"/>
+        <pc:sldMkLst>
+          <pc:docMk/>
+          <pc:sldMk cId="2549208066" sldId="339"/>
+        </pc:sldMkLst>
+      </pc:sldChg>
+      <pc:sldChg chg="del">
+        <pc:chgData name="Patryk Serafin" userId="86fa742248e137ce" providerId="LiveId" clId="{339EAE9B-F713-4D08-858A-8BD130048AC7}" dt="2024-02-04T12:49:23.435" v="0" actId="47"/>
+        <pc:sldMkLst>
+          <pc:docMk/>
+          <pc:sldMk cId="4007445916" sldId="340"/>
+        </pc:sldMkLst>
+      </pc:sldChg>
+      <pc:sldChg chg="del">
+        <pc:chgData name="Patryk Serafin" userId="86fa742248e137ce" providerId="LiveId" clId="{339EAE9B-F713-4D08-858A-8BD130048AC7}" dt="2024-02-04T12:49:23.435" v="0" actId="47"/>
+        <pc:sldMkLst>
+          <pc:docMk/>
+          <pc:sldMk cId="4113879274" sldId="358"/>
+        </pc:sldMkLst>
+      </pc:sldChg>
+      <pc:sldChg chg="del">
+        <pc:chgData name="Patryk Serafin" userId="86fa742248e137ce" providerId="LiveId" clId="{339EAE9B-F713-4D08-858A-8BD130048AC7}" dt="2024-02-04T12:49:23.435" v="0" actId="47"/>
+        <pc:sldMkLst>
+          <pc:docMk/>
+          <pc:sldMk cId="571492126" sldId="359"/>
+        </pc:sldMkLst>
+      </pc:sldChg>
+      <pc:sldChg chg="del">
+        <pc:chgData name="Patryk Serafin" userId="86fa742248e137ce" providerId="LiveId" clId="{339EAE9B-F713-4D08-858A-8BD130048AC7}" dt="2024-02-04T12:49:23.435" v="0" actId="47"/>
+        <pc:sldMkLst>
+          <pc:docMk/>
+          <pc:sldMk cId="3869047721" sldId="361"/>
+        </pc:sldMkLst>
+      </pc:sldChg>
+      <pc:sldChg chg="del">
+        <pc:chgData name="Patryk Serafin" userId="86fa742248e137ce" providerId="LiveId" clId="{339EAE9B-F713-4D08-858A-8BD130048AC7}" dt="2024-02-04T12:49:23.435" v="0" actId="47"/>
+        <pc:sldMkLst>
+          <pc:docMk/>
+          <pc:sldMk cId="1574004732" sldId="365"/>
+        </pc:sldMkLst>
+      </pc:sldChg>
+      <pc:sldChg chg="del">
+        <pc:chgData name="Patryk Serafin" userId="86fa742248e137ce" providerId="LiveId" clId="{339EAE9B-F713-4D08-858A-8BD130048AC7}" dt="2024-02-04T12:49:23.435" v="0" actId="47"/>
+        <pc:sldMkLst>
+          <pc:docMk/>
+          <pc:sldMk cId="2524299725" sldId="366"/>
+        </pc:sldMkLst>
+      </pc:sldChg>
+      <pc:sldChg chg="del">
+        <pc:chgData name="Patryk Serafin" userId="86fa742248e137ce" providerId="LiveId" clId="{339EAE9B-F713-4D08-858A-8BD130048AC7}" dt="2024-02-04T12:49:23.435" v="0" actId="47"/>
+        <pc:sldMkLst>
+          <pc:docMk/>
+          <pc:sldMk cId="863844165" sldId="369"/>
+        </pc:sldMkLst>
+      </pc:sldChg>
+      <pc:sldChg chg="del">
+        <pc:chgData name="Patryk Serafin" userId="86fa742248e137ce" providerId="LiveId" clId="{339EAE9B-F713-4D08-858A-8BD130048AC7}" dt="2024-02-04T12:49:23.435" v="0" actId="47"/>
+        <pc:sldMkLst>
+          <pc:docMk/>
+          <pc:sldMk cId="1140178177" sldId="372"/>
+        </pc:sldMkLst>
+      </pc:sldChg>
+      <pc:sldChg chg="del">
+        <pc:chgData name="Patryk Serafin" userId="86fa742248e137ce" providerId="LiveId" clId="{339EAE9B-F713-4D08-858A-8BD130048AC7}" dt="2024-02-04T12:49:23.435" v="0" actId="47"/>
+        <pc:sldMkLst>
+          <pc:docMk/>
+          <pc:sldMk cId="1968622345" sldId="373"/>
+        </pc:sldMkLst>
+      </pc:sldChg>
+      <pc:sldChg chg="del">
+        <pc:chgData name="Patryk Serafin" userId="86fa742248e137ce" providerId="LiveId" clId="{339EAE9B-F713-4D08-858A-8BD130048AC7}" dt="2024-02-04T12:49:23.435" v="0" actId="47"/>
+        <pc:sldMkLst>
+          <pc:docMk/>
+          <pc:sldMk cId="1180631931" sldId="377"/>
+        </pc:sldMkLst>
+      </pc:sldChg>
+      <pc:sldChg chg="del">
+        <pc:chgData name="Patryk Serafin" userId="86fa742248e137ce" providerId="LiveId" clId="{339EAE9B-F713-4D08-858A-8BD130048AC7}" dt="2024-02-04T12:49:23.435" v="0" actId="47"/>
+        <pc:sldMkLst>
+          <pc:docMk/>
+          <pc:sldMk cId="289399001" sldId="378"/>
+        </pc:sldMkLst>
+      </pc:sldChg>
+      <pc:sldChg chg="del">
+        <pc:chgData name="Patryk Serafin" userId="86fa742248e137ce" providerId="LiveId" clId="{339EAE9B-F713-4D08-858A-8BD130048AC7}" dt="2024-02-04T12:49:23.435" v="0" actId="47"/>
+        <pc:sldMkLst>
+          <pc:docMk/>
+          <pc:sldMk cId="3037249080" sldId="379"/>
+        </pc:sldMkLst>
+      </pc:sldChg>
+      <pc:sldChg chg="del">
+        <pc:chgData name="Patryk Serafin" userId="86fa742248e137ce" providerId="LiveId" clId="{339EAE9B-F713-4D08-858A-8BD130048AC7}" dt="2024-02-04T12:49:23.435" v="0" actId="47"/>
+        <pc:sldMkLst>
+          <pc:docMk/>
+          <pc:sldMk cId="3265729095" sldId="380"/>
         </pc:sldMkLst>
       </pc:sldChg>
     </pc:docChg>
@@ -477,12 +503,12 @@
   <pc:docChgLst>
     <pc:chgData name="Patryk Serafin" userId="86fa742248e137ce" providerId="LiveId" clId="{3298C733-EA56-44BD-B82F-19114443C032}"/>
     <pc:docChg chg="undo redo custSel addSld delSld modSld sldOrd addMainMaster delMainMaster">
-      <pc:chgData name="Patryk Serafin" userId="86fa742248e137ce" providerId="LiveId" clId="{3298C733-EA56-44BD-B82F-19114443C032}" dt="2024-01-28T15:15:54.598" v="1792"/>
+      <pc:chgData name="Patryk Serafin" userId="86fa742248e137ce" providerId="LiveId" clId="{3298C733-EA56-44BD-B82F-19114443C032}" dt="2024-01-30T22:43:19.667" v="3909" actId="20577"/>
       <pc:docMkLst>
         <pc:docMk/>
       </pc:docMkLst>
       <pc:sldChg chg="addSp delSp modSp new mod setBg modClrScheme addAnim delAnim modAnim chgLayout">
-        <pc:chgData name="Patryk Serafin" userId="86fa742248e137ce" providerId="LiveId" clId="{3298C733-EA56-44BD-B82F-19114443C032}" dt="2024-01-27T10:40:00.057" v="136"/>
+        <pc:chgData name="Patryk Serafin" userId="86fa742248e137ce" providerId="LiveId" clId="{3298C733-EA56-44BD-B82F-19114443C032}" dt="2024-01-30T22:41:30.444" v="3899" actId="27636"/>
         <pc:sldMkLst>
           <pc:docMk/>
           <pc:sldMk cId="2421352655" sldId="256"/>
@@ -496,7 +522,7 @@
           </ac:spMkLst>
         </pc:spChg>
         <pc:spChg chg="mod">
-          <ac:chgData name="Patryk Serafin" userId="86fa742248e137ce" providerId="LiveId" clId="{3298C733-EA56-44BD-B82F-19114443C032}" dt="2024-01-27T10:39:50.724" v="134" actId="26606"/>
+          <ac:chgData name="Patryk Serafin" userId="86fa742248e137ce" providerId="LiveId" clId="{3298C733-EA56-44BD-B82F-19114443C032}" dt="2024-01-30T22:41:30.444" v="3899" actId="27636"/>
           <ac:spMkLst>
             <pc:docMk/>
             <pc:sldMk cId="2421352655" sldId="256"/>
@@ -1162,8 +1188,8 @@
           </ac:spMkLst>
         </pc:spChg>
       </pc:sldChg>
-      <pc:sldChg chg="modSp new mod">
-        <pc:chgData name="Patryk Serafin" userId="86fa742248e137ce" providerId="LiveId" clId="{3298C733-EA56-44BD-B82F-19114443C032}" dt="2024-01-27T10:49:32.323" v="191"/>
+      <pc:sldChg chg="modSp new del mod">
+        <pc:chgData name="Patryk Serafin" userId="86fa742248e137ce" providerId="LiveId" clId="{3298C733-EA56-44BD-B82F-19114443C032}" dt="2024-01-29T17:30:04.116" v="2259" actId="47"/>
         <pc:sldMkLst>
           <pc:docMk/>
           <pc:sldMk cId="3131933903" sldId="271"/>
@@ -1216,8 +1242,8 @@
           </ac:spMkLst>
         </pc:spChg>
       </pc:sldChg>
-      <pc:sldChg chg="modSp new mod">
-        <pc:chgData name="Patryk Serafin" userId="86fa742248e137ce" providerId="LiveId" clId="{3298C733-EA56-44BD-B82F-19114443C032}" dt="2024-01-27T10:49:44.274" v="194"/>
+      <pc:sldChg chg="modSp new del mod">
+        <pc:chgData name="Patryk Serafin" userId="86fa742248e137ce" providerId="LiveId" clId="{3298C733-EA56-44BD-B82F-19114443C032}" dt="2024-01-29T17:30:06.651" v="2260" actId="47"/>
         <pc:sldMkLst>
           <pc:docMk/>
           <pc:sldMk cId="2048330268" sldId="273"/>
@@ -1239,8 +1265,8 @@
           </ac:spMkLst>
         </pc:spChg>
       </pc:sldChg>
-      <pc:sldChg chg="modSp new mod">
-        <pc:chgData name="Patryk Serafin" userId="86fa742248e137ce" providerId="LiveId" clId="{3298C733-EA56-44BD-B82F-19114443C032}" dt="2024-01-27T10:50:08.889" v="200"/>
+      <pc:sldChg chg="modSp new del mod">
+        <pc:chgData name="Patryk Serafin" userId="86fa742248e137ce" providerId="LiveId" clId="{3298C733-EA56-44BD-B82F-19114443C032}" dt="2024-01-29T17:30:29.401" v="2263" actId="47"/>
         <pc:sldMkLst>
           <pc:docMk/>
           <pc:sldMk cId="1120940816" sldId="274"/>
@@ -1293,8 +1319,8 @@
           </ac:spMkLst>
         </pc:spChg>
       </pc:sldChg>
-      <pc:sldChg chg="modSp new mod">
-        <pc:chgData name="Patryk Serafin" userId="86fa742248e137ce" providerId="LiveId" clId="{3298C733-EA56-44BD-B82F-19114443C032}" dt="2024-01-27T10:50:26.554" v="203"/>
+      <pc:sldChg chg="modSp new del mod">
+        <pc:chgData name="Patryk Serafin" userId="86fa742248e137ce" providerId="LiveId" clId="{3298C733-EA56-44BD-B82F-19114443C032}" dt="2024-01-29T17:30:30.226" v="2264" actId="47"/>
         <pc:sldMkLst>
           <pc:docMk/>
           <pc:sldMk cId="2303647636" sldId="276"/>
@@ -1316,8 +1342,8 @@
           </ac:spMkLst>
         </pc:spChg>
       </pc:sldChg>
-      <pc:sldChg chg="modSp new mod">
-        <pc:chgData name="Patryk Serafin" userId="86fa742248e137ce" providerId="LiveId" clId="{3298C733-EA56-44BD-B82F-19114443C032}" dt="2024-01-27T10:50:54.200" v="210"/>
+      <pc:sldChg chg="modSp new del mod">
+        <pc:chgData name="Patryk Serafin" userId="86fa742248e137ce" providerId="LiveId" clId="{3298C733-EA56-44BD-B82F-19114443C032}" dt="2024-01-29T18:05:08.101" v="3096" actId="47"/>
         <pc:sldMkLst>
           <pc:docMk/>
           <pc:sldMk cId="256880835" sldId="277"/>
@@ -1370,8 +1396,8 @@
           </ac:spMkLst>
         </pc:spChg>
       </pc:sldChg>
-      <pc:sldChg chg="modSp add mod">
-        <pc:chgData name="Patryk Serafin" userId="86fa742248e137ce" providerId="LiveId" clId="{3298C733-EA56-44BD-B82F-19114443C032}" dt="2024-01-27T10:51:04.918" v="212"/>
+      <pc:sldChg chg="modSp add del mod">
+        <pc:chgData name="Patryk Serafin" userId="86fa742248e137ce" providerId="LiveId" clId="{3298C733-EA56-44BD-B82F-19114443C032}" dt="2024-01-29T18:05:09.499" v="3097" actId="47"/>
         <pc:sldMkLst>
           <pc:docMk/>
           <pc:sldMk cId="1532553888" sldId="279"/>
@@ -1655,13 +1681,13 @@
         </pc:picChg>
       </pc:sldChg>
       <pc:sldChg chg="addSp delSp modSp add mod setBg">
-        <pc:chgData name="Patryk Serafin" userId="86fa742248e137ce" providerId="LiveId" clId="{3298C733-EA56-44BD-B82F-19114443C032}" dt="2024-01-27T10:57:48.806" v="299" actId="26606"/>
+        <pc:chgData name="Patryk Serafin" userId="86fa742248e137ce" providerId="LiveId" clId="{3298C733-EA56-44BD-B82F-19114443C032}" dt="2024-01-30T22:42:55.567" v="3905" actId="20577"/>
         <pc:sldMkLst>
           <pc:docMk/>
           <pc:sldMk cId="3115832531" sldId="291"/>
         </pc:sldMkLst>
         <pc:spChg chg="mod">
-          <ac:chgData name="Patryk Serafin" userId="86fa742248e137ce" providerId="LiveId" clId="{3298C733-EA56-44BD-B82F-19114443C032}" dt="2024-01-27T10:57:48.806" v="299" actId="26606"/>
+          <ac:chgData name="Patryk Serafin" userId="86fa742248e137ce" providerId="LiveId" clId="{3298C733-EA56-44BD-B82F-19114443C032}" dt="2024-01-30T22:42:55.567" v="3905" actId="20577"/>
           <ac:spMkLst>
             <pc:docMk/>
             <pc:sldMk cId="3115832531" sldId="291"/>
@@ -1702,13 +1728,13 @@
         </pc:spChg>
       </pc:sldChg>
       <pc:sldChg chg="addSp modSp add mod setBg">
-        <pc:chgData name="Patryk Serafin" userId="86fa742248e137ce" providerId="LiveId" clId="{3298C733-EA56-44BD-B82F-19114443C032}" dt="2024-01-27T10:58:03.876" v="302" actId="26606"/>
+        <pc:chgData name="Patryk Serafin" userId="86fa742248e137ce" providerId="LiveId" clId="{3298C733-EA56-44BD-B82F-19114443C032}" dt="2024-01-30T22:43:00.478" v="3906" actId="20577"/>
         <pc:sldMkLst>
           <pc:docMk/>
           <pc:sldMk cId="1777602640" sldId="292"/>
         </pc:sldMkLst>
         <pc:spChg chg="mod">
-          <ac:chgData name="Patryk Serafin" userId="86fa742248e137ce" providerId="LiveId" clId="{3298C733-EA56-44BD-B82F-19114443C032}" dt="2024-01-27T10:58:03.876" v="302" actId="26606"/>
+          <ac:chgData name="Patryk Serafin" userId="86fa742248e137ce" providerId="LiveId" clId="{3298C733-EA56-44BD-B82F-19114443C032}" dt="2024-01-30T22:43:00.478" v="3906" actId="20577"/>
           <ac:spMkLst>
             <pc:docMk/>
             <pc:sldMk cId="1777602640" sldId="292"/>
@@ -1733,13 +1759,13 @@
         </pc:spChg>
       </pc:sldChg>
       <pc:sldChg chg="addSp modSp add mod setBg">
-        <pc:chgData name="Patryk Serafin" userId="86fa742248e137ce" providerId="LiveId" clId="{3298C733-EA56-44BD-B82F-19114443C032}" dt="2024-01-27T10:58:08.965" v="303" actId="26606"/>
+        <pc:chgData name="Patryk Serafin" userId="86fa742248e137ce" providerId="LiveId" clId="{3298C733-EA56-44BD-B82F-19114443C032}" dt="2024-01-30T22:43:11.660" v="3908" actId="20577"/>
         <pc:sldMkLst>
           <pc:docMk/>
           <pc:sldMk cId="64165896" sldId="293"/>
         </pc:sldMkLst>
         <pc:spChg chg="mod">
-          <ac:chgData name="Patryk Serafin" userId="86fa742248e137ce" providerId="LiveId" clId="{3298C733-EA56-44BD-B82F-19114443C032}" dt="2024-01-27T10:58:08.965" v="303" actId="26606"/>
+          <ac:chgData name="Patryk Serafin" userId="86fa742248e137ce" providerId="LiveId" clId="{3298C733-EA56-44BD-B82F-19114443C032}" dt="2024-01-30T22:43:11.660" v="3908" actId="20577"/>
           <ac:spMkLst>
             <pc:docMk/>
             <pc:sldMk cId="64165896" sldId="293"/>
@@ -2786,13 +2812,13 @@
         </pc:spChg>
       </pc:sldChg>
       <pc:sldChg chg="addSp delSp modSp add mod setBg delDesignElem">
-        <pc:chgData name="Patryk Serafin" userId="86fa742248e137ce" providerId="LiveId" clId="{3298C733-EA56-44BD-B82F-19114443C032}" dt="2024-01-28T11:53:26.333" v="611" actId="26606"/>
+        <pc:chgData name="Patryk Serafin" userId="86fa742248e137ce" providerId="LiveId" clId="{3298C733-EA56-44BD-B82F-19114443C032}" dt="2024-01-30T22:43:19.667" v="3909" actId="20577"/>
         <pc:sldMkLst>
           <pc:docMk/>
           <pc:sldMk cId="1419307233" sldId="336"/>
         </pc:sldMkLst>
         <pc:spChg chg="mod">
-          <ac:chgData name="Patryk Serafin" userId="86fa742248e137ce" providerId="LiveId" clId="{3298C733-EA56-44BD-B82F-19114443C032}" dt="2024-01-28T11:53:26.333" v="611" actId="26606"/>
+          <ac:chgData name="Patryk Serafin" userId="86fa742248e137ce" providerId="LiveId" clId="{3298C733-EA56-44BD-B82F-19114443C032}" dt="2024-01-30T22:42:44.957" v="3901" actId="20577"/>
           <ac:spMkLst>
             <pc:docMk/>
             <pc:sldMk cId="1419307233" sldId="336"/>
@@ -2800,7 +2826,7 @@
           </ac:spMkLst>
         </pc:spChg>
         <pc:spChg chg="mod">
-          <ac:chgData name="Patryk Serafin" userId="86fa742248e137ce" providerId="LiveId" clId="{3298C733-EA56-44BD-B82F-19114443C032}" dt="2024-01-28T11:53:22.065" v="609"/>
+          <ac:chgData name="Patryk Serafin" userId="86fa742248e137ce" providerId="LiveId" clId="{3298C733-EA56-44BD-B82F-19114443C032}" dt="2024-01-30T22:43:19.667" v="3909" actId="20577"/>
           <ac:spMkLst>
             <pc:docMk/>
             <pc:sldMk cId="1419307233" sldId="336"/>
@@ -3736,6 +3762,1140 @@
             <ac:picMk id="4" creationId="{B6B93A28-5D41-43C6-B15E-E06B4CC5DA95}"/>
           </ac:picMkLst>
         </pc:picChg>
+      </pc:sldChg>
+      <pc:sldChg chg="modSp add del mod">
+        <pc:chgData name="Patryk Serafin" userId="86fa742248e137ce" providerId="LiveId" clId="{3298C733-EA56-44BD-B82F-19114443C032}" dt="2024-01-29T17:27:05.755" v="2164" actId="47"/>
+        <pc:sldMkLst>
+          <pc:docMk/>
+          <pc:sldMk cId="3156861942" sldId="357"/>
+        </pc:sldMkLst>
+        <pc:spChg chg="mod">
+          <ac:chgData name="Patryk Serafin" userId="86fa742248e137ce" providerId="LiveId" clId="{3298C733-EA56-44BD-B82F-19114443C032}" dt="2024-01-29T17:25:18.985" v="1817" actId="20577"/>
+          <ac:spMkLst>
+            <pc:docMk/>
+            <pc:sldMk cId="3156861942" sldId="357"/>
+            <ac:spMk id="2" creationId="{8D3B7598-6223-AB96-D5BE-E3F07BBEF30F}"/>
+          </ac:spMkLst>
+        </pc:spChg>
+        <pc:spChg chg="mod">
+          <ac:chgData name="Patryk Serafin" userId="86fa742248e137ce" providerId="LiveId" clId="{3298C733-EA56-44BD-B82F-19114443C032}" dt="2024-01-29T17:26:23.223" v="2156" actId="20577"/>
+          <ac:spMkLst>
+            <pc:docMk/>
+            <pc:sldMk cId="3156861942" sldId="357"/>
+            <ac:spMk id="3" creationId="{859F2BBE-89DD-168F-5C13-939BC123A84B}"/>
+          </ac:spMkLst>
+        </pc:spChg>
+      </pc:sldChg>
+      <pc:sldChg chg="addSp delSp modSp add mod setBg delDesignElem">
+        <pc:chgData name="Patryk Serafin" userId="86fa742248e137ce" providerId="LiveId" clId="{3298C733-EA56-44BD-B82F-19114443C032}" dt="2024-01-29T17:30:51.661" v="2283" actId="26606"/>
+        <pc:sldMkLst>
+          <pc:docMk/>
+          <pc:sldMk cId="4113879274" sldId="358"/>
+        </pc:sldMkLst>
+        <pc:spChg chg="mod">
+          <ac:chgData name="Patryk Serafin" userId="86fa742248e137ce" providerId="LiveId" clId="{3298C733-EA56-44BD-B82F-19114443C032}" dt="2024-01-29T17:26:53.603" v="2163" actId="26606"/>
+          <ac:spMkLst>
+            <pc:docMk/>
+            <pc:sldMk cId="4113879274" sldId="358"/>
+            <ac:spMk id="2" creationId="{0AE5D857-3FF0-8164-6B5D-266F7B555FB8}"/>
+          </ac:spMkLst>
+        </pc:spChg>
+        <pc:spChg chg="mod">
+          <ac:chgData name="Patryk Serafin" userId="86fa742248e137ce" providerId="LiveId" clId="{3298C733-EA56-44BD-B82F-19114443C032}" dt="2024-01-29T17:26:53.603" v="2163" actId="26606"/>
+          <ac:spMkLst>
+            <pc:docMk/>
+            <pc:sldMk cId="4113879274" sldId="358"/>
+            <ac:spMk id="3" creationId="{C9B62D80-9255-C4D4-FD0C-629149E7F4CD}"/>
+          </ac:spMkLst>
+        </pc:spChg>
+        <pc:spChg chg="del">
+          <ac:chgData name="Patryk Serafin" userId="86fa742248e137ce" providerId="LiveId" clId="{3298C733-EA56-44BD-B82F-19114443C032}" dt="2024-01-29T17:26:32.659" v="2158"/>
+          <ac:spMkLst>
+            <pc:docMk/>
+            <pc:sldMk cId="4113879274" sldId="358"/>
+            <ac:spMk id="10" creationId="{92CC1E4F-F1F0-B945-BE50-C72A7103E8AC}"/>
+          </ac:spMkLst>
+        </pc:spChg>
+        <pc:spChg chg="add del">
+          <ac:chgData name="Patryk Serafin" userId="86fa742248e137ce" providerId="LiveId" clId="{3298C733-EA56-44BD-B82F-19114443C032}" dt="2024-01-29T17:30:51.661" v="2283" actId="26606"/>
+          <ac:spMkLst>
+            <pc:docMk/>
+            <pc:sldMk cId="4113879274" sldId="358"/>
+            <ac:spMk id="12" creationId="{92CC1E4F-F1F0-B945-BE50-C72A7103E8AC}"/>
+          </ac:spMkLst>
+        </pc:spChg>
+        <pc:spChg chg="add">
+          <ac:chgData name="Patryk Serafin" userId="86fa742248e137ce" providerId="LiveId" clId="{3298C733-EA56-44BD-B82F-19114443C032}" dt="2024-01-29T17:30:51.661" v="2283" actId="26606"/>
+          <ac:spMkLst>
+            <pc:docMk/>
+            <pc:sldMk cId="4113879274" sldId="358"/>
+            <ac:spMk id="17" creationId="{92CC1E4F-F1F0-B945-BE50-C72A7103E8AC}"/>
+          </ac:spMkLst>
+        </pc:spChg>
+      </pc:sldChg>
+      <pc:sldChg chg="addSp delSp modSp add mod setBg delDesignElem">
+        <pc:chgData name="Patryk Serafin" userId="86fa742248e137ce" providerId="LiveId" clId="{3298C733-EA56-44BD-B82F-19114443C032}" dt="2024-01-30T21:12:56.915" v="3265"/>
+        <pc:sldMkLst>
+          <pc:docMk/>
+          <pc:sldMk cId="571492126" sldId="359"/>
+        </pc:sldMkLst>
+        <pc:spChg chg="mod">
+          <ac:chgData name="Patryk Serafin" userId="86fa742248e137ce" providerId="LiveId" clId="{3298C733-EA56-44BD-B82F-19114443C032}" dt="2024-01-29T17:27:20.230" v="2196" actId="20577"/>
+          <ac:spMkLst>
+            <pc:docMk/>
+            <pc:sldMk cId="571492126" sldId="359"/>
+            <ac:spMk id="2" creationId="{0AE5D857-3FF0-8164-6B5D-266F7B555FB8}"/>
+          </ac:spMkLst>
+        </pc:spChg>
+        <pc:spChg chg="mod">
+          <ac:chgData name="Patryk Serafin" userId="86fa742248e137ce" providerId="LiveId" clId="{3298C733-EA56-44BD-B82F-19114443C032}" dt="2024-01-30T21:12:56.915" v="3265"/>
+          <ac:spMkLst>
+            <pc:docMk/>
+            <pc:sldMk cId="571492126" sldId="359"/>
+            <ac:spMk id="3" creationId="{C9B62D80-9255-C4D4-FD0C-629149E7F4CD}"/>
+          </ac:spMkLst>
+        </pc:spChg>
+        <pc:spChg chg="add">
+          <ac:chgData name="Patryk Serafin" userId="86fa742248e137ce" providerId="LiveId" clId="{3298C733-EA56-44BD-B82F-19114443C032}" dt="2024-01-29T17:30:49.735" v="2282" actId="26606"/>
+          <ac:spMkLst>
+            <pc:docMk/>
+            <pc:sldMk cId="571492126" sldId="359"/>
+            <ac:spMk id="9" creationId="{92CC1E4F-F1F0-B945-BE50-C72A7103E8AC}"/>
+          </ac:spMkLst>
+        </pc:spChg>
+        <pc:spChg chg="del">
+          <ac:chgData name="Patryk Serafin" userId="86fa742248e137ce" providerId="LiveId" clId="{3298C733-EA56-44BD-B82F-19114443C032}" dt="2024-01-29T17:27:10.142" v="2166"/>
+          <ac:spMkLst>
+            <pc:docMk/>
+            <pc:sldMk cId="571492126" sldId="359"/>
+            <ac:spMk id="12" creationId="{92CC1E4F-F1F0-B945-BE50-C72A7103E8AC}"/>
+          </ac:spMkLst>
+        </pc:spChg>
+      </pc:sldChg>
+      <pc:sldChg chg="addSp delSp modSp add del mod setBg">
+        <pc:chgData name="Patryk Serafin" userId="86fa742248e137ce" providerId="LiveId" clId="{3298C733-EA56-44BD-B82F-19114443C032}" dt="2024-01-29T17:54:52.499" v="2893" actId="47"/>
+        <pc:sldMkLst>
+          <pc:docMk/>
+          <pc:sldMk cId="1609197875" sldId="360"/>
+        </pc:sldMkLst>
+        <pc:spChg chg="mod">
+          <ac:chgData name="Patryk Serafin" userId="86fa742248e137ce" providerId="LiveId" clId="{3298C733-EA56-44BD-B82F-19114443C032}" dt="2024-01-29T17:27:59.594" v="2211" actId="20577"/>
+          <ac:spMkLst>
+            <pc:docMk/>
+            <pc:sldMk cId="1609197875" sldId="360"/>
+            <ac:spMk id="2" creationId="{0AE5D857-3FF0-8164-6B5D-266F7B555FB8}"/>
+          </ac:spMkLst>
+        </pc:spChg>
+        <pc:spChg chg="mod">
+          <ac:chgData name="Patryk Serafin" userId="86fa742248e137ce" providerId="LiveId" clId="{3298C733-EA56-44BD-B82F-19114443C032}" dt="2024-01-29T17:46:29.332" v="2571" actId="20577"/>
+          <ac:spMkLst>
+            <pc:docMk/>
+            <pc:sldMk cId="1609197875" sldId="360"/>
+            <ac:spMk id="3" creationId="{C9B62D80-9255-C4D4-FD0C-629149E7F4CD}"/>
+          </ac:spMkLst>
+        </pc:spChg>
+        <pc:spChg chg="add">
+          <ac:chgData name="Patryk Serafin" userId="86fa742248e137ce" providerId="LiveId" clId="{3298C733-EA56-44BD-B82F-19114443C032}" dt="2024-01-29T17:28:08.363" v="2212"/>
+          <ac:spMkLst>
+            <pc:docMk/>
+            <pc:sldMk cId="1609197875" sldId="360"/>
+            <ac:spMk id="4" creationId="{43DE1368-1ECC-C7BD-E98C-E355B7FF4E77}"/>
+          </ac:spMkLst>
+        </pc:spChg>
+        <pc:spChg chg="add del">
+          <ac:chgData name="Patryk Serafin" userId="86fa742248e137ce" providerId="LiveId" clId="{3298C733-EA56-44BD-B82F-19114443C032}" dt="2024-01-29T17:30:47.981" v="2281" actId="26606"/>
+          <ac:spMkLst>
+            <pc:docMk/>
+            <pc:sldMk cId="1609197875" sldId="360"/>
+            <ac:spMk id="12" creationId="{92CC1E4F-F1F0-B945-BE50-C72A7103E8AC}"/>
+          </ac:spMkLst>
+        </pc:spChg>
+        <pc:spChg chg="add">
+          <ac:chgData name="Patryk Serafin" userId="86fa742248e137ce" providerId="LiveId" clId="{3298C733-EA56-44BD-B82F-19114443C032}" dt="2024-01-29T17:30:47.981" v="2281" actId="26606"/>
+          <ac:spMkLst>
+            <pc:docMk/>
+            <pc:sldMk cId="1609197875" sldId="360"/>
+            <ac:spMk id="17" creationId="{92CC1E4F-F1F0-B945-BE50-C72A7103E8AC}"/>
+          </ac:spMkLst>
+        </pc:spChg>
+        <pc:graphicFrameChg chg="add del mod modGraphic">
+          <ac:chgData name="Patryk Serafin" userId="86fa742248e137ce" providerId="LiveId" clId="{3298C733-EA56-44BD-B82F-19114443C032}" dt="2024-01-29T17:47:01.392" v="2576" actId="21"/>
+          <ac:graphicFrameMkLst>
+            <pc:docMk/>
+            <pc:sldMk cId="1609197875" sldId="360"/>
+            <ac:graphicFrameMk id="5" creationId="{00413B8C-9952-4E05-F6E4-9413539A87A7}"/>
+          </ac:graphicFrameMkLst>
+        </pc:graphicFrameChg>
+        <pc:graphicFrameChg chg="add mod modGraphic">
+          <ac:chgData name="Patryk Serafin" userId="86fa742248e137ce" providerId="LiveId" clId="{3298C733-EA56-44BD-B82F-19114443C032}" dt="2024-01-29T17:51:25.660" v="2858" actId="404"/>
+          <ac:graphicFrameMkLst>
+            <pc:docMk/>
+            <pc:sldMk cId="1609197875" sldId="360"/>
+            <ac:graphicFrameMk id="6" creationId="{00413B8C-9952-4E05-F6E4-9413539A87A7}"/>
+          </ac:graphicFrameMkLst>
+        </pc:graphicFrameChg>
+      </pc:sldChg>
+      <pc:sldChg chg="addSp delSp modSp add mod setBg">
+        <pc:chgData name="Patryk Serafin" userId="86fa742248e137ce" providerId="LiveId" clId="{3298C733-EA56-44BD-B82F-19114443C032}" dt="2024-01-30T21:42:39.512" v="3471" actId="20577"/>
+        <pc:sldMkLst>
+          <pc:docMk/>
+          <pc:sldMk cId="3869047721" sldId="361"/>
+        </pc:sldMkLst>
+        <pc:spChg chg="mod">
+          <ac:chgData name="Patryk Serafin" userId="86fa742248e137ce" providerId="LiveId" clId="{3298C733-EA56-44BD-B82F-19114443C032}" dt="2024-01-29T17:30:34.698" v="2271" actId="20577"/>
+          <ac:spMkLst>
+            <pc:docMk/>
+            <pc:sldMk cId="3869047721" sldId="361"/>
+            <ac:spMk id="2" creationId="{0AE5D857-3FF0-8164-6B5D-266F7B555FB8}"/>
+          </ac:spMkLst>
+        </pc:spChg>
+        <pc:spChg chg="mod">
+          <ac:chgData name="Patryk Serafin" userId="86fa742248e137ce" providerId="LiveId" clId="{3298C733-EA56-44BD-B82F-19114443C032}" dt="2024-01-30T21:42:39.512" v="3471" actId="20577"/>
+          <ac:spMkLst>
+            <pc:docMk/>
+            <pc:sldMk cId="3869047721" sldId="361"/>
+            <ac:spMk id="3" creationId="{C9B62D80-9255-C4D4-FD0C-629149E7F4CD}"/>
+          </ac:spMkLst>
+        </pc:spChg>
+        <pc:spChg chg="add del">
+          <ac:chgData name="Patryk Serafin" userId="86fa742248e137ce" providerId="LiveId" clId="{3298C733-EA56-44BD-B82F-19114443C032}" dt="2024-01-30T21:02:43.620" v="3192" actId="26606"/>
+          <ac:spMkLst>
+            <pc:docMk/>
+            <pc:sldMk cId="3869047721" sldId="361"/>
+            <ac:spMk id="12" creationId="{92CC1E4F-F1F0-B945-BE50-C72A7103E8AC}"/>
+          </ac:spMkLst>
+        </pc:spChg>
+        <pc:spChg chg="add">
+          <ac:chgData name="Patryk Serafin" userId="86fa742248e137ce" providerId="LiveId" clId="{3298C733-EA56-44BD-B82F-19114443C032}" dt="2024-01-30T21:02:43.620" v="3192" actId="26606"/>
+          <ac:spMkLst>
+            <pc:docMk/>
+            <pc:sldMk cId="3869047721" sldId="361"/>
+            <ac:spMk id="17" creationId="{92CC1E4F-F1F0-B945-BE50-C72A7103E8AC}"/>
+          </ac:spMkLst>
+        </pc:spChg>
+      </pc:sldChg>
+      <pc:sldChg chg="delSp modSp add del mod setBg delDesignElem">
+        <pc:chgData name="Patryk Serafin" userId="86fa742248e137ce" providerId="LiveId" clId="{3298C733-EA56-44BD-B82F-19114443C032}" dt="2024-01-29T17:57:58.344" v="2921" actId="47"/>
+        <pc:sldMkLst>
+          <pc:docMk/>
+          <pc:sldMk cId="2910191425" sldId="362"/>
+        </pc:sldMkLst>
+        <pc:spChg chg="mod">
+          <ac:chgData name="Patryk Serafin" userId="86fa742248e137ce" providerId="LiveId" clId="{3298C733-EA56-44BD-B82F-19114443C032}" dt="2024-01-29T17:30:43.860" v="2280" actId="20577"/>
+          <ac:spMkLst>
+            <pc:docMk/>
+            <pc:sldMk cId="2910191425" sldId="362"/>
+            <ac:spMk id="2" creationId="{0AE5D857-3FF0-8164-6B5D-266F7B555FB8}"/>
+          </ac:spMkLst>
+        </pc:spChg>
+        <pc:spChg chg="del">
+          <ac:chgData name="Patryk Serafin" userId="86fa742248e137ce" providerId="LiveId" clId="{3298C733-EA56-44BD-B82F-19114443C032}" dt="2024-01-29T17:30:27.508" v="2262"/>
+          <ac:spMkLst>
+            <pc:docMk/>
+            <pc:sldMk cId="2910191425" sldId="362"/>
+            <ac:spMk id="12" creationId="{92CC1E4F-F1F0-B945-BE50-C72A7103E8AC}"/>
+          </ac:spMkLst>
+        </pc:spChg>
+      </pc:sldChg>
+      <pc:sldChg chg="new del">
+        <pc:chgData name="Patryk Serafin" userId="86fa742248e137ce" providerId="LiveId" clId="{3298C733-EA56-44BD-B82F-19114443C032}" dt="2024-01-29T17:46:19.393" v="2570" actId="47"/>
+        <pc:sldMkLst>
+          <pc:docMk/>
+          <pc:sldMk cId="1499472927" sldId="363"/>
+        </pc:sldMkLst>
+      </pc:sldChg>
+      <pc:sldChg chg="addSp delSp modSp add del mod setBg delDesignElem">
+        <pc:chgData name="Patryk Serafin" userId="86fa742248e137ce" providerId="LiveId" clId="{3298C733-EA56-44BD-B82F-19114443C032}" dt="2024-01-29T17:55:01.370" v="2896" actId="47"/>
+        <pc:sldMkLst>
+          <pc:docMk/>
+          <pc:sldMk cId="1211665943" sldId="364"/>
+        </pc:sldMkLst>
+        <pc:spChg chg="mod">
+          <ac:chgData name="Patryk Serafin" userId="86fa742248e137ce" providerId="LiveId" clId="{3298C733-EA56-44BD-B82F-19114443C032}" dt="2024-01-29T17:46:32.308" v="2572" actId="6549"/>
+          <ac:spMkLst>
+            <pc:docMk/>
+            <pc:sldMk cId="1211665943" sldId="364"/>
+            <ac:spMk id="3" creationId="{C9B62D80-9255-C4D4-FD0C-629149E7F4CD}"/>
+          </ac:spMkLst>
+        </pc:spChg>
+        <pc:spChg chg="del">
+          <ac:chgData name="Patryk Serafin" userId="86fa742248e137ce" providerId="LiveId" clId="{3298C733-EA56-44BD-B82F-19114443C032}" dt="2024-01-29T17:46:18.356" v="2569"/>
+          <ac:spMkLst>
+            <pc:docMk/>
+            <pc:sldMk cId="1211665943" sldId="364"/>
+            <ac:spMk id="17" creationId="{92CC1E4F-F1F0-B945-BE50-C72A7103E8AC}"/>
+          </ac:spMkLst>
+        </pc:spChg>
+        <pc:graphicFrameChg chg="add mod">
+          <ac:chgData name="Patryk Serafin" userId="86fa742248e137ce" providerId="LiveId" clId="{3298C733-EA56-44BD-B82F-19114443C032}" dt="2024-01-29T17:47:05.213" v="2578"/>
+          <ac:graphicFrameMkLst>
+            <pc:docMk/>
+            <pc:sldMk cId="1211665943" sldId="364"/>
+            <ac:graphicFrameMk id="4" creationId="{776D2BB7-BBB6-8452-EF61-089AE1D0A0AD}"/>
+          </ac:graphicFrameMkLst>
+        </pc:graphicFrameChg>
+        <pc:graphicFrameChg chg="add mod modGraphic">
+          <ac:chgData name="Patryk Serafin" userId="86fa742248e137ce" providerId="LiveId" clId="{3298C733-EA56-44BD-B82F-19114443C032}" dt="2024-01-29T17:52:20.439" v="2876" actId="1076"/>
+          <ac:graphicFrameMkLst>
+            <pc:docMk/>
+            <pc:sldMk cId="1211665943" sldId="364"/>
+            <ac:graphicFrameMk id="5" creationId="{8EAF1596-A717-EA58-E4AF-5CBDD2452A6D}"/>
+          </ac:graphicFrameMkLst>
+        </pc:graphicFrameChg>
+      </pc:sldChg>
+      <pc:sldChg chg="addSp delSp modSp mod">
+        <pc:chgData name="Patryk Serafin" userId="86fa742248e137ce" providerId="LiveId" clId="{3298C733-EA56-44BD-B82F-19114443C032}" dt="2024-01-30T22:23:25.074" v="3799"/>
+        <pc:sldMkLst>
+          <pc:docMk/>
+          <pc:sldMk cId="1574004732" sldId="365"/>
+        </pc:sldMkLst>
+        <pc:spChg chg="mod">
+          <ac:chgData name="Patryk Serafin" userId="86fa742248e137ce" providerId="LiveId" clId="{3298C733-EA56-44BD-B82F-19114443C032}" dt="2024-01-30T21:12:12.151" v="3261" actId="26606"/>
+          <ac:spMkLst>
+            <pc:docMk/>
+            <pc:sldMk cId="1574004732" sldId="365"/>
+            <ac:spMk id="2" creationId="{10BE58C5-E636-9AF0-5EAF-780BB6E9363B}"/>
+          </ac:spMkLst>
+        </pc:spChg>
+        <pc:spChg chg="add del mod">
+          <ac:chgData name="Patryk Serafin" userId="86fa742248e137ce" providerId="LiveId" clId="{3298C733-EA56-44BD-B82F-19114443C032}" dt="2024-01-29T17:54:43.918" v="2891" actId="478"/>
+          <ac:spMkLst>
+            <pc:docMk/>
+            <pc:sldMk cId="1574004732" sldId="365"/>
+            <ac:spMk id="4" creationId="{F6B3079F-F550-6519-8141-1C43610723E8}"/>
+          </ac:spMkLst>
+        </pc:spChg>
+        <pc:spChg chg="add del">
+          <ac:chgData name="Patryk Serafin" userId="86fa742248e137ce" providerId="LiveId" clId="{3298C733-EA56-44BD-B82F-19114443C032}" dt="2024-01-29T17:54:10.875" v="2884" actId="478"/>
+          <ac:spMkLst>
+            <pc:docMk/>
+            <pc:sldMk cId="1574004732" sldId="365"/>
+            <ac:spMk id="10" creationId="{54A6F7B4-E461-3779-F3C5-CC792BFCA2B9}"/>
+          </ac:spMkLst>
+        </pc:spChg>
+        <pc:spChg chg="add del">
+          <ac:chgData name="Patryk Serafin" userId="86fa742248e137ce" providerId="LiveId" clId="{3298C733-EA56-44BD-B82F-19114443C032}" dt="2024-01-29T17:56:48.324" v="2910" actId="26606"/>
+          <ac:spMkLst>
+            <pc:docMk/>
+            <pc:sldMk cId="1574004732" sldId="365"/>
+            <ac:spMk id="16" creationId="{7A875D55-4A80-43E9-38F6-27E3664939B0}"/>
+          </ac:spMkLst>
+        </pc:spChg>
+        <pc:spChg chg="add del">
+          <ac:chgData name="Patryk Serafin" userId="86fa742248e137ce" providerId="LiveId" clId="{3298C733-EA56-44BD-B82F-19114443C032}" dt="2024-01-29T17:56:48.324" v="2910" actId="26606"/>
+          <ac:spMkLst>
+            <pc:docMk/>
+            <pc:sldMk cId="1574004732" sldId="365"/>
+            <ac:spMk id="18" creationId="{3D572980-FB84-8C29-1FAC-FAC5ECE29A39}"/>
+          </ac:spMkLst>
+        </pc:spChg>
+        <pc:spChg chg="add del">
+          <ac:chgData name="Patryk Serafin" userId="86fa742248e137ce" providerId="LiveId" clId="{3298C733-EA56-44BD-B82F-19114443C032}" dt="2024-01-29T17:56:48.308" v="2909" actId="26606"/>
+          <ac:spMkLst>
+            <pc:docMk/>
+            <pc:sldMk cId="1574004732" sldId="365"/>
+            <ac:spMk id="20" creationId="{6DA9942F-A18C-9E9D-BF08-9291C54E1CC4}"/>
+          </ac:spMkLst>
+        </pc:spChg>
+        <pc:spChg chg="add del">
+          <ac:chgData name="Patryk Serafin" userId="86fa742248e137ce" providerId="LiveId" clId="{3298C733-EA56-44BD-B82F-19114443C032}" dt="2024-01-30T21:12:12.177" v="3262" actId="26606"/>
+          <ac:spMkLst>
+            <pc:docMk/>
+            <pc:sldMk cId="1574004732" sldId="365"/>
+            <ac:spMk id="22" creationId="{9B65F7F7-2FCE-8F01-53DE-15C39342BE99}"/>
+          </ac:spMkLst>
+        </pc:spChg>
+        <pc:spChg chg="add del">
+          <ac:chgData name="Patryk Serafin" userId="86fa742248e137ce" providerId="LiveId" clId="{3298C733-EA56-44BD-B82F-19114443C032}" dt="2024-01-29T17:55:45.740" v="2900" actId="26606"/>
+          <ac:spMkLst>
+            <pc:docMk/>
+            <pc:sldMk cId="1574004732" sldId="365"/>
+            <ac:spMk id="23" creationId="{9B65F7F7-2FCE-8F01-53DE-15C39342BE99}"/>
+          </ac:spMkLst>
+        </pc:spChg>
+        <pc:spChg chg="add del">
+          <ac:chgData name="Patryk Serafin" userId="86fa742248e137ce" providerId="LiveId" clId="{3298C733-EA56-44BD-B82F-19114443C032}" dt="2024-01-29T17:55:46.385" v="2902" actId="26606"/>
+          <ac:spMkLst>
+            <pc:docMk/>
+            <pc:sldMk cId="1574004732" sldId="365"/>
+            <ac:spMk id="25" creationId="{6DA9942F-A18C-9E9D-BF08-9291C54E1CC4}"/>
+          </ac:spMkLst>
+        </pc:spChg>
+        <pc:spChg chg="add del">
+          <ac:chgData name="Patryk Serafin" userId="86fa742248e137ce" providerId="LiveId" clId="{3298C733-EA56-44BD-B82F-19114443C032}" dt="2024-01-30T21:12:12.151" v="3261" actId="26606"/>
+          <ac:spMkLst>
+            <pc:docMk/>
+            <pc:sldMk cId="1574004732" sldId="365"/>
+            <ac:spMk id="27" creationId="{6DA9942F-A18C-9E9D-BF08-9291C54E1CC4}"/>
+          </ac:spMkLst>
+        </pc:spChg>
+        <pc:spChg chg="add del">
+          <ac:chgData name="Patryk Serafin" userId="86fa742248e137ce" providerId="LiveId" clId="{3298C733-EA56-44BD-B82F-19114443C032}" dt="2024-01-30T21:12:23.232" v="3264" actId="26606"/>
+          <ac:spMkLst>
+            <pc:docMk/>
+            <pc:sldMk cId="1574004732" sldId="365"/>
+            <ac:spMk id="29" creationId="{9B65F7F7-2FCE-8F01-53DE-15C39342BE99}"/>
+          </ac:spMkLst>
+        </pc:spChg>
+        <pc:spChg chg="add del">
+          <ac:chgData name="Patryk Serafin" userId="86fa742248e137ce" providerId="LiveId" clId="{3298C733-EA56-44BD-B82F-19114443C032}" dt="2024-01-30T21:57:58.045" v="3544" actId="26606"/>
+          <ac:spMkLst>
+            <pc:docMk/>
+            <pc:sldMk cId="1574004732" sldId="365"/>
+            <ac:spMk id="34" creationId="{9B65F7F7-2FCE-8F01-53DE-15C39342BE99}"/>
+          </ac:spMkLst>
+        </pc:spChg>
+        <pc:spChg chg="add del">
+          <ac:chgData name="Patryk Serafin" userId="86fa742248e137ce" providerId="LiveId" clId="{3298C733-EA56-44BD-B82F-19114443C032}" dt="2024-01-30T21:58:17.738" v="3558" actId="26606"/>
+          <ac:spMkLst>
+            <pc:docMk/>
+            <pc:sldMk cId="1574004732" sldId="365"/>
+            <ac:spMk id="39" creationId="{9B65F7F7-2FCE-8F01-53DE-15C39342BE99}"/>
+          </ac:spMkLst>
+        </pc:spChg>
+        <pc:spChg chg="add del">
+          <ac:chgData name="Patryk Serafin" userId="86fa742248e137ce" providerId="LiveId" clId="{3298C733-EA56-44BD-B82F-19114443C032}" dt="2024-01-30T22:15:53.926" v="3584" actId="26606"/>
+          <ac:spMkLst>
+            <pc:docMk/>
+            <pc:sldMk cId="1574004732" sldId="365"/>
+            <ac:spMk id="44" creationId="{9B65F7F7-2FCE-8F01-53DE-15C39342BE99}"/>
+          </ac:spMkLst>
+        </pc:spChg>
+        <pc:spChg chg="add del">
+          <ac:chgData name="Patryk Serafin" userId="86fa742248e137ce" providerId="LiveId" clId="{3298C733-EA56-44BD-B82F-19114443C032}" dt="2024-01-30T22:22:30.856" v="3714" actId="26606"/>
+          <ac:spMkLst>
+            <pc:docMk/>
+            <pc:sldMk cId="1574004732" sldId="365"/>
+            <ac:spMk id="49" creationId="{9B65F7F7-2FCE-8F01-53DE-15C39342BE99}"/>
+          </ac:spMkLst>
+        </pc:spChg>
+        <pc:spChg chg="add">
+          <ac:chgData name="Patryk Serafin" userId="86fa742248e137ce" providerId="LiveId" clId="{3298C733-EA56-44BD-B82F-19114443C032}" dt="2024-01-30T22:22:30.856" v="3714" actId="26606"/>
+          <ac:spMkLst>
+            <pc:docMk/>
+            <pc:sldMk cId="1574004732" sldId="365"/>
+            <ac:spMk id="54" creationId="{9B65F7F7-2FCE-8F01-53DE-15C39342BE99}"/>
+          </ac:spMkLst>
+        </pc:spChg>
+        <pc:graphicFrameChg chg="add mod modGraphic">
+          <ac:chgData name="Patryk Serafin" userId="86fa742248e137ce" providerId="LiveId" clId="{3298C733-EA56-44BD-B82F-19114443C032}" dt="2024-01-30T22:23:25.074" v="3799"/>
+          <ac:graphicFrameMkLst>
+            <pc:docMk/>
+            <pc:sldMk cId="1574004732" sldId="365"/>
+            <ac:graphicFrameMk id="6" creationId="{10331853-0410-6F37-ED46-ADB41E39E48D}"/>
+          </ac:graphicFrameMkLst>
+        </pc:graphicFrameChg>
+        <pc:picChg chg="add del">
+          <ac:chgData name="Patryk Serafin" userId="86fa742248e137ce" providerId="LiveId" clId="{3298C733-EA56-44BD-B82F-19114443C032}" dt="2024-01-29T17:56:42.110" v="2907" actId="478"/>
+          <ac:picMkLst>
+            <pc:docMk/>
+            <pc:sldMk cId="1574004732" sldId="365"/>
+            <ac:picMk id="5" creationId="{88FC8634-41DF-C798-95D2-660516FF6668}"/>
+          </ac:picMkLst>
+        </pc:picChg>
+        <pc:picChg chg="del">
+          <ac:chgData name="Patryk Serafin" userId="86fa742248e137ce" providerId="LiveId" clId="{3298C733-EA56-44BD-B82F-19114443C032}" dt="2024-01-29T17:54:05.959" v="2881" actId="478"/>
+          <ac:picMkLst>
+            <pc:docMk/>
+            <pc:sldMk cId="1574004732" sldId="365"/>
+            <ac:picMk id="8" creationId="{D1C34A3D-99C2-5D4C-BCC8-8B28E6F15FED}"/>
+          </ac:picMkLst>
+        </pc:picChg>
+      </pc:sldChg>
+      <pc:sldChg chg="addSp delSp add del setBg delDesignElem">
+        <pc:chgData name="Patryk Serafin" userId="86fa742248e137ce" providerId="LiveId" clId="{3298C733-EA56-44BD-B82F-19114443C032}" dt="2024-01-29T17:53:49.590" v="2879"/>
+        <pc:sldMkLst>
+          <pc:docMk/>
+          <pc:sldMk cId="3497136587" sldId="365"/>
+        </pc:sldMkLst>
+        <pc:spChg chg="add del">
+          <ac:chgData name="Patryk Serafin" userId="86fa742248e137ce" providerId="LiveId" clId="{3298C733-EA56-44BD-B82F-19114443C032}" dt="2024-01-29T17:53:49.590" v="2879"/>
+          <ac:spMkLst>
+            <pc:docMk/>
+            <pc:sldMk cId="3497136587" sldId="365"/>
+            <ac:spMk id="16" creationId="{7A875D55-4A80-43E9-38F6-27E3664939B0}"/>
+          </ac:spMkLst>
+        </pc:spChg>
+        <pc:spChg chg="add del">
+          <ac:chgData name="Patryk Serafin" userId="86fa742248e137ce" providerId="LiveId" clId="{3298C733-EA56-44BD-B82F-19114443C032}" dt="2024-01-29T17:53:49.590" v="2879"/>
+          <ac:spMkLst>
+            <pc:docMk/>
+            <pc:sldMk cId="3497136587" sldId="365"/>
+            <ac:spMk id="18" creationId="{3D572980-FB84-8C29-1FAC-FAC5ECE29A39}"/>
+          </ac:spMkLst>
+        </pc:spChg>
+      </pc:sldChg>
+      <pc:sldChg chg="addSp delSp modSp mod">
+        <pc:chgData name="Patryk Serafin" userId="86fa742248e137ce" providerId="LiveId" clId="{3298C733-EA56-44BD-B82F-19114443C032}" dt="2024-01-30T22:23:34.444" v="3802" actId="26606"/>
+        <pc:sldMkLst>
+          <pc:docMk/>
+          <pc:sldMk cId="2524299725" sldId="366"/>
+        </pc:sldMkLst>
+        <pc:spChg chg="mod">
+          <ac:chgData name="Patryk Serafin" userId="86fa742248e137ce" providerId="LiveId" clId="{3298C733-EA56-44BD-B82F-19114443C032}" dt="2024-01-29T17:57:04.235" v="2920" actId="26606"/>
+          <ac:spMkLst>
+            <pc:docMk/>
+            <pc:sldMk cId="2524299725" sldId="366"/>
+            <ac:spMk id="2" creationId="{10BE58C5-E636-9AF0-5EAF-780BB6E9363B}"/>
+          </ac:spMkLst>
+        </pc:spChg>
+        <pc:spChg chg="del">
+          <ac:chgData name="Patryk Serafin" userId="86fa742248e137ce" providerId="LiveId" clId="{3298C733-EA56-44BD-B82F-19114443C032}" dt="2024-01-29T17:55:00.024" v="2895" actId="478"/>
+          <ac:spMkLst>
+            <pc:docMk/>
+            <pc:sldMk cId="2524299725" sldId="366"/>
+            <ac:spMk id="4" creationId="{F6B3079F-F550-6519-8141-1C43610723E8}"/>
+          </ac:spMkLst>
+        </pc:spChg>
+        <pc:spChg chg="add del">
+          <ac:chgData name="Patryk Serafin" userId="86fa742248e137ce" providerId="LiveId" clId="{3298C733-EA56-44BD-B82F-19114443C032}" dt="2024-01-29T17:57:04.235" v="2920" actId="26606"/>
+          <ac:spMkLst>
+            <pc:docMk/>
+            <pc:sldMk cId="2524299725" sldId="366"/>
+            <ac:spMk id="16" creationId="{7A875D55-4A80-43E9-38F6-27E3664939B0}"/>
+          </ac:spMkLst>
+        </pc:spChg>
+        <pc:spChg chg="add del">
+          <ac:chgData name="Patryk Serafin" userId="86fa742248e137ce" providerId="LiveId" clId="{3298C733-EA56-44BD-B82F-19114443C032}" dt="2024-01-29T17:57:04.235" v="2920" actId="26606"/>
+          <ac:spMkLst>
+            <pc:docMk/>
+            <pc:sldMk cId="2524299725" sldId="366"/>
+            <ac:spMk id="18" creationId="{3D572980-FB84-8C29-1FAC-FAC5ECE29A39}"/>
+          </ac:spMkLst>
+        </pc:spChg>
+        <pc:spChg chg="add del">
+          <ac:chgData name="Patryk Serafin" userId="86fa742248e137ce" providerId="LiveId" clId="{3298C733-EA56-44BD-B82F-19114443C032}" dt="2024-01-30T21:16:11.793" v="3272" actId="26606"/>
+          <ac:spMkLst>
+            <pc:docMk/>
+            <pc:sldMk cId="2524299725" sldId="366"/>
+            <ac:spMk id="23" creationId="{9B65F7F7-2FCE-8F01-53DE-15C39342BE99}"/>
+          </ac:spMkLst>
+        </pc:spChg>
+        <pc:spChg chg="add del">
+          <ac:chgData name="Patryk Serafin" userId="86fa742248e137ce" providerId="LiveId" clId="{3298C733-EA56-44BD-B82F-19114443C032}" dt="2024-01-30T21:16:34.639" v="3273" actId="26606"/>
+          <ac:spMkLst>
+            <pc:docMk/>
+            <pc:sldMk cId="2524299725" sldId="366"/>
+            <ac:spMk id="25" creationId="{9B65F7F7-2FCE-8F01-53DE-15C39342BE99}"/>
+          </ac:spMkLst>
+        </pc:spChg>
+        <pc:spChg chg="add del">
+          <ac:chgData name="Patryk Serafin" userId="86fa742248e137ce" providerId="LiveId" clId="{3298C733-EA56-44BD-B82F-19114443C032}" dt="2024-01-30T22:15:59.352" v="3585" actId="26606"/>
+          <ac:spMkLst>
+            <pc:docMk/>
+            <pc:sldMk cId="2524299725" sldId="366"/>
+            <ac:spMk id="27" creationId="{9B65F7F7-2FCE-8F01-53DE-15C39342BE99}"/>
+          </ac:spMkLst>
+        </pc:spChg>
+        <pc:spChg chg="add del">
+          <ac:chgData name="Patryk Serafin" userId="86fa742248e137ce" providerId="LiveId" clId="{3298C733-EA56-44BD-B82F-19114443C032}" dt="2024-01-29T17:56:59.472" v="2914" actId="26606"/>
+          <ac:spMkLst>
+            <pc:docMk/>
+            <pc:sldMk cId="2524299725" sldId="366"/>
+            <ac:spMk id="28" creationId="{6DA9942F-A18C-9E9D-BF08-9291C54E1CC4}"/>
+          </ac:spMkLst>
+        </pc:spChg>
+        <pc:spChg chg="add del">
+          <ac:chgData name="Patryk Serafin" userId="86fa742248e137ce" providerId="LiveId" clId="{3298C733-EA56-44BD-B82F-19114443C032}" dt="2024-01-30T22:23:34.444" v="3802" actId="26606"/>
+          <ac:spMkLst>
+            <pc:docMk/>
+            <pc:sldMk cId="2524299725" sldId="366"/>
+            <ac:spMk id="29" creationId="{9B65F7F7-2FCE-8F01-53DE-15C39342BE99}"/>
+          </ac:spMkLst>
+        </pc:spChg>
+        <pc:spChg chg="add del">
+          <ac:chgData name="Patryk Serafin" userId="86fa742248e137ce" providerId="LiveId" clId="{3298C733-EA56-44BD-B82F-19114443C032}" dt="2024-01-29T17:57:01.437" v="2916" actId="26606"/>
+          <ac:spMkLst>
+            <pc:docMk/>
+            <pc:sldMk cId="2524299725" sldId="366"/>
+            <ac:spMk id="30" creationId="{87B4472A-332B-71E5-8009-33841E7C3F0B}"/>
+          </ac:spMkLst>
+        </pc:spChg>
+        <pc:spChg chg="add del">
+          <ac:chgData name="Patryk Serafin" userId="86fa742248e137ce" providerId="LiveId" clId="{3298C733-EA56-44BD-B82F-19114443C032}" dt="2024-01-29T17:57:03.181" v="2918" actId="26606"/>
+          <ac:spMkLst>
+            <pc:docMk/>
+            <pc:sldMk cId="2524299725" sldId="366"/>
+            <ac:spMk id="32" creationId="{340A7190-01C3-EB5F-290B-2565AB617987}"/>
+          </ac:spMkLst>
+        </pc:spChg>
+        <pc:spChg chg="add">
+          <ac:chgData name="Patryk Serafin" userId="86fa742248e137ce" providerId="LiveId" clId="{3298C733-EA56-44BD-B82F-19114443C032}" dt="2024-01-30T22:23:34.444" v="3802" actId="26606"/>
+          <ac:spMkLst>
+            <pc:docMk/>
+            <pc:sldMk cId="2524299725" sldId="366"/>
+            <ac:spMk id="34" creationId="{9B65F7F7-2FCE-8F01-53DE-15C39342BE99}"/>
+          </ac:spMkLst>
+        </pc:spChg>
+        <pc:graphicFrameChg chg="add del mod modGraphic">
+          <ac:chgData name="Patryk Serafin" userId="86fa742248e137ce" providerId="LiveId" clId="{3298C733-EA56-44BD-B82F-19114443C032}" dt="2024-01-30T21:57:07.727" v="3533" actId="478"/>
+          <ac:graphicFrameMkLst>
+            <pc:docMk/>
+            <pc:sldMk cId="2524299725" sldId="366"/>
+            <ac:graphicFrameMk id="3" creationId="{5B8A0917-D61B-E7D8-9307-B2F8C561760E}"/>
+          </ac:graphicFrameMkLst>
+        </pc:graphicFrameChg>
+        <pc:graphicFrameChg chg="add mod modGraphic">
+          <ac:chgData name="Patryk Serafin" userId="86fa742248e137ce" providerId="LiveId" clId="{3298C733-EA56-44BD-B82F-19114443C032}" dt="2024-01-30T22:23:34.444" v="3802" actId="26606"/>
+          <ac:graphicFrameMkLst>
+            <pc:docMk/>
+            <pc:sldMk cId="2524299725" sldId="366"/>
+            <ac:graphicFrameMk id="4" creationId="{9D7EDAEA-1CF8-8949-F65C-B6B5C0C24DE8}"/>
+          </ac:graphicFrameMkLst>
+        </pc:graphicFrameChg>
+        <pc:picChg chg="del">
+          <ac:chgData name="Patryk Serafin" userId="86fa742248e137ce" providerId="LiveId" clId="{3298C733-EA56-44BD-B82F-19114443C032}" dt="2024-01-29T17:56:51.167" v="2911" actId="478"/>
+          <ac:picMkLst>
+            <pc:docMk/>
+            <pc:sldMk cId="2524299725" sldId="366"/>
+            <ac:picMk id="5" creationId="{88FC8634-41DF-C798-95D2-660516FF6668}"/>
+          </ac:picMkLst>
+        </pc:picChg>
+      </pc:sldChg>
+      <pc:sldChg chg="addSp delSp add del setBg delDesignElem">
+        <pc:chgData name="Patryk Serafin" userId="86fa742248e137ce" providerId="LiveId" clId="{3298C733-EA56-44BD-B82F-19114443C032}" dt="2024-01-29T17:54:19.895" v="2887"/>
+        <pc:sldMkLst>
+          <pc:docMk/>
+          <pc:sldMk cId="3085108084" sldId="366"/>
+        </pc:sldMkLst>
+        <pc:spChg chg="add del">
+          <ac:chgData name="Patryk Serafin" userId="86fa742248e137ce" providerId="LiveId" clId="{3298C733-EA56-44BD-B82F-19114443C032}" dt="2024-01-29T17:54:19.895" v="2887"/>
+          <ac:spMkLst>
+            <pc:docMk/>
+            <pc:sldMk cId="3085108084" sldId="366"/>
+            <ac:spMk id="16" creationId="{7A875D55-4A80-43E9-38F6-27E3664939B0}"/>
+          </ac:spMkLst>
+        </pc:spChg>
+        <pc:spChg chg="add del">
+          <ac:chgData name="Patryk Serafin" userId="86fa742248e137ce" providerId="LiveId" clId="{3298C733-EA56-44BD-B82F-19114443C032}" dt="2024-01-29T17:54:19.895" v="2887"/>
+          <ac:spMkLst>
+            <pc:docMk/>
+            <pc:sldMk cId="3085108084" sldId="366"/>
+            <ac:spMk id="18" creationId="{3D572980-FB84-8C29-1FAC-FAC5ECE29A39}"/>
+          </ac:spMkLst>
+        </pc:spChg>
+      </pc:sldChg>
+      <pc:sldChg chg="addSp delSp modSp add del mod setBg delDesignElem">
+        <pc:chgData name="Patryk Serafin" userId="86fa742248e137ce" providerId="LiveId" clId="{3298C733-EA56-44BD-B82F-19114443C032}" dt="2024-01-30T21:46:20.424" v="3482" actId="47"/>
+        <pc:sldMkLst>
+          <pc:docMk/>
+          <pc:sldMk cId="701034893" sldId="367"/>
+        </pc:sldMkLst>
+        <pc:spChg chg="mod">
+          <ac:chgData name="Patryk Serafin" userId="86fa742248e137ce" providerId="LiveId" clId="{3298C733-EA56-44BD-B82F-19114443C032}" dt="2024-01-29T18:00:08.291" v="3007" actId="26606"/>
+          <ac:spMkLst>
+            <pc:docMk/>
+            <pc:sldMk cId="701034893" sldId="367"/>
+            <ac:spMk id="2" creationId="{10BE58C5-E636-9AF0-5EAF-780BB6E9363B}"/>
+          </ac:spMkLst>
+        </pc:spChg>
+        <pc:spChg chg="add del">
+          <ac:chgData name="Patryk Serafin" userId="86fa742248e137ce" providerId="LiveId" clId="{3298C733-EA56-44BD-B82F-19114443C032}" dt="2024-01-30T21:36:59.959" v="3412" actId="26606"/>
+          <ac:spMkLst>
+            <pc:docMk/>
+            <pc:sldMk cId="701034893" sldId="367"/>
+            <ac:spMk id="8" creationId="{9B65F7F7-2FCE-8F01-53DE-15C39342BE99}"/>
+          </ac:spMkLst>
+        </pc:spChg>
+        <pc:spChg chg="add del">
+          <ac:chgData name="Patryk Serafin" userId="86fa742248e137ce" providerId="LiveId" clId="{3298C733-EA56-44BD-B82F-19114443C032}" dt="2024-01-30T21:42:24.213" v="3464" actId="26606"/>
+          <ac:spMkLst>
+            <pc:docMk/>
+            <pc:sldMk cId="701034893" sldId="367"/>
+            <ac:spMk id="10" creationId="{9B65F7F7-2FCE-8F01-53DE-15C39342BE99}"/>
+          </ac:spMkLst>
+        </pc:spChg>
+        <pc:spChg chg="add del">
+          <ac:chgData name="Patryk Serafin" userId="86fa742248e137ce" providerId="LiveId" clId="{3298C733-EA56-44BD-B82F-19114443C032}" dt="2024-01-30T21:16:52.184" v="3277" actId="26606"/>
+          <ac:spMkLst>
+            <pc:docMk/>
+            <pc:sldMk cId="701034893" sldId="367"/>
+            <ac:spMk id="13" creationId="{9B65F7F7-2FCE-8F01-53DE-15C39342BE99}"/>
+          </ac:spMkLst>
+        </pc:spChg>
+        <pc:spChg chg="add">
+          <ac:chgData name="Patryk Serafin" userId="86fa742248e137ce" providerId="LiveId" clId="{3298C733-EA56-44BD-B82F-19114443C032}" dt="2024-01-30T21:42:24.213" v="3464" actId="26606"/>
+          <ac:spMkLst>
+            <pc:docMk/>
+            <pc:sldMk cId="701034893" sldId="367"/>
+            <ac:spMk id="15" creationId="{9B65F7F7-2FCE-8F01-53DE-15C39342BE99}"/>
+          </ac:spMkLst>
+        </pc:spChg>
+        <pc:spChg chg="del">
+          <ac:chgData name="Patryk Serafin" userId="86fa742248e137ce" providerId="LiveId" clId="{3298C733-EA56-44BD-B82F-19114443C032}" dt="2024-01-29T17:58:01.348" v="2923"/>
+          <ac:spMkLst>
+            <pc:docMk/>
+            <pc:sldMk cId="701034893" sldId="367"/>
+            <ac:spMk id="23" creationId="{9B65F7F7-2FCE-8F01-53DE-15C39342BE99}"/>
+          </ac:spMkLst>
+        </pc:spChg>
+        <pc:graphicFrameChg chg="del mod modGraphic">
+          <ac:chgData name="Patryk Serafin" userId="86fa742248e137ce" providerId="LiveId" clId="{3298C733-EA56-44BD-B82F-19114443C032}" dt="2024-01-30T21:16:46.131" v="3274" actId="478"/>
+          <ac:graphicFrameMkLst>
+            <pc:docMk/>
+            <pc:sldMk cId="701034893" sldId="367"/>
+            <ac:graphicFrameMk id="3" creationId="{5B8A0917-D61B-E7D8-9307-B2F8C561760E}"/>
+          </ac:graphicFrameMkLst>
+        </pc:graphicFrameChg>
+        <pc:graphicFrameChg chg="add mod modGraphic">
+          <ac:chgData name="Patryk Serafin" userId="86fa742248e137ce" providerId="LiveId" clId="{3298C733-EA56-44BD-B82F-19114443C032}" dt="2024-01-30T21:46:12.849" v="3479" actId="20577"/>
+          <ac:graphicFrameMkLst>
+            <pc:docMk/>
+            <pc:sldMk cId="701034893" sldId="367"/>
+            <ac:graphicFrameMk id="4" creationId="{B13F895E-50F9-E3E6-3598-7B5060A73A41}"/>
+          </ac:graphicFrameMkLst>
+        </pc:graphicFrameChg>
+      </pc:sldChg>
+      <pc:sldChg chg="addSp delSp modSp add del mod setBg delDesignElem">
+        <pc:chgData name="Patryk Serafin" userId="86fa742248e137ce" providerId="LiveId" clId="{3298C733-EA56-44BD-B82F-19114443C032}" dt="2024-01-30T21:36:03.079" v="3377" actId="47"/>
+        <pc:sldMkLst>
+          <pc:docMk/>
+          <pc:sldMk cId="1381971387" sldId="368"/>
+        </pc:sldMkLst>
+        <pc:spChg chg="del">
+          <ac:chgData name="Patryk Serafin" userId="86fa742248e137ce" providerId="LiveId" clId="{3298C733-EA56-44BD-B82F-19114443C032}" dt="2024-01-29T18:00:22.077" v="3009"/>
+          <ac:spMkLst>
+            <pc:docMk/>
+            <pc:sldMk cId="1381971387" sldId="368"/>
+            <ac:spMk id="8" creationId="{9B65F7F7-2FCE-8F01-53DE-15C39342BE99}"/>
+          </ac:spMkLst>
+        </pc:spChg>
+        <pc:graphicFrameChg chg="mod modGraphic">
+          <ac:chgData name="Patryk Serafin" userId="86fa742248e137ce" providerId="LiveId" clId="{3298C733-EA56-44BD-B82F-19114443C032}" dt="2024-01-30T21:20:07.057" v="3323" actId="20577"/>
+          <ac:graphicFrameMkLst>
+            <pc:docMk/>
+            <pc:sldMk cId="1381971387" sldId="368"/>
+            <ac:graphicFrameMk id="3" creationId="{5B8A0917-D61B-E7D8-9307-B2F8C561760E}"/>
+          </ac:graphicFrameMkLst>
+        </pc:graphicFrameChg>
+        <pc:graphicFrameChg chg="add del mod modGraphic">
+          <ac:chgData name="Patryk Serafin" userId="86fa742248e137ce" providerId="LiveId" clId="{3298C733-EA56-44BD-B82F-19114443C032}" dt="2024-01-30T21:19:26.290" v="3313" actId="478"/>
+          <ac:graphicFrameMkLst>
+            <pc:docMk/>
+            <pc:sldMk cId="1381971387" sldId="368"/>
+            <ac:graphicFrameMk id="4" creationId="{F7B1645C-2A9A-984F-D0ED-E15087E96E62}"/>
+          </ac:graphicFrameMkLst>
+        </pc:graphicFrameChg>
+        <pc:graphicFrameChg chg="add del mod modGraphic">
+          <ac:chgData name="Patryk Serafin" userId="86fa742248e137ce" providerId="LiveId" clId="{3298C733-EA56-44BD-B82F-19114443C032}" dt="2024-01-30T21:19:24.872" v="3312" actId="478"/>
+          <ac:graphicFrameMkLst>
+            <pc:docMk/>
+            <pc:sldMk cId="1381971387" sldId="368"/>
+            <ac:graphicFrameMk id="5" creationId="{3E508669-E4B8-CC33-69B9-E03AB01409B0}"/>
+          </ac:graphicFrameMkLst>
+        </pc:graphicFrameChg>
+        <pc:graphicFrameChg chg="add mod modGraphic">
+          <ac:chgData name="Patryk Serafin" userId="86fa742248e137ce" providerId="LiveId" clId="{3298C733-EA56-44BD-B82F-19114443C032}" dt="2024-01-30T21:20:03.114" v="3319" actId="20577"/>
+          <ac:graphicFrameMkLst>
+            <pc:docMk/>
+            <pc:sldMk cId="1381971387" sldId="368"/>
+            <ac:graphicFrameMk id="6" creationId="{DB2620F9-4637-FFF5-6734-6ADEE6E3807C}"/>
+          </ac:graphicFrameMkLst>
+        </pc:graphicFrameChg>
+      </pc:sldChg>
+      <pc:sldChg chg="addSp delSp modSp add mod setBg delDesignElem">
+        <pc:chgData name="Patryk Serafin" userId="86fa742248e137ce" providerId="LiveId" clId="{3298C733-EA56-44BD-B82F-19114443C032}" dt="2024-01-30T21:13:21.433" v="3267"/>
+        <pc:sldMkLst>
+          <pc:docMk/>
+          <pc:sldMk cId="863844165" sldId="369"/>
+        </pc:sldMkLst>
+        <pc:spChg chg="mod">
+          <ac:chgData name="Patryk Serafin" userId="86fa742248e137ce" providerId="LiveId" clId="{3298C733-EA56-44BD-B82F-19114443C032}" dt="2024-01-29T18:05:16.154" v="3108" actId="20577"/>
+          <ac:spMkLst>
+            <pc:docMk/>
+            <pc:sldMk cId="863844165" sldId="369"/>
+            <ac:spMk id="2" creationId="{0AE5D857-3FF0-8164-6B5D-266F7B555FB8}"/>
+          </ac:spMkLst>
+        </pc:spChg>
+        <pc:spChg chg="mod">
+          <ac:chgData name="Patryk Serafin" userId="86fa742248e137ce" providerId="LiveId" clId="{3298C733-EA56-44BD-B82F-19114443C032}" dt="2024-01-30T21:13:21.433" v="3267"/>
+          <ac:spMkLst>
+            <pc:docMk/>
+            <pc:sldMk cId="863844165" sldId="369"/>
+            <ac:spMk id="3" creationId="{C9B62D80-9255-C4D4-FD0C-629149E7F4CD}"/>
+          </ac:spMkLst>
+        </pc:spChg>
+        <pc:spChg chg="add">
+          <ac:chgData name="Patryk Serafin" userId="86fa742248e137ce" providerId="LiveId" clId="{3298C733-EA56-44BD-B82F-19114443C032}" dt="2024-01-30T21:02:38.711" v="3191" actId="26606"/>
+          <ac:spMkLst>
+            <pc:docMk/>
+            <pc:sldMk cId="863844165" sldId="369"/>
+            <ac:spMk id="9" creationId="{92CC1E4F-F1F0-B945-BE50-C72A7103E8AC}"/>
+          </ac:spMkLst>
+        </pc:spChg>
+        <pc:spChg chg="del">
+          <ac:chgData name="Patryk Serafin" userId="86fa742248e137ce" providerId="LiveId" clId="{3298C733-EA56-44BD-B82F-19114443C032}" dt="2024-01-29T18:05:06.605" v="3095"/>
+          <ac:spMkLst>
+            <pc:docMk/>
+            <pc:sldMk cId="863844165" sldId="369"/>
+            <ac:spMk id="12" creationId="{92CC1E4F-F1F0-B945-BE50-C72A7103E8AC}"/>
+          </ac:spMkLst>
+        </pc:spChg>
+      </pc:sldChg>
+      <pc:sldChg chg="modSp add del mod">
+        <pc:chgData name="Patryk Serafin" userId="86fa742248e137ce" providerId="LiveId" clId="{3298C733-EA56-44BD-B82F-19114443C032}" dt="2024-01-30T21:22:39.224" v="3335" actId="47"/>
+        <pc:sldMkLst>
+          <pc:docMk/>
+          <pc:sldMk cId="475907582" sldId="370"/>
+        </pc:sldMkLst>
+        <pc:spChg chg="mod">
+          <ac:chgData name="Patryk Serafin" userId="86fa742248e137ce" providerId="LiveId" clId="{3298C733-EA56-44BD-B82F-19114443C032}" dt="2024-01-29T18:07:26.335" v="3121" actId="20577"/>
+          <ac:spMkLst>
+            <pc:docMk/>
+            <pc:sldMk cId="475907582" sldId="370"/>
+            <ac:spMk id="2" creationId="{10BE58C5-E636-9AF0-5EAF-780BB6E9363B}"/>
+          </ac:spMkLst>
+        </pc:spChg>
+      </pc:sldChg>
+      <pc:sldChg chg="addSp modSp add del mod">
+        <pc:chgData name="Patryk Serafin" userId="86fa742248e137ce" providerId="LiveId" clId="{3298C733-EA56-44BD-B82F-19114443C032}" dt="2024-01-30T21:23:09.608" v="3347" actId="47"/>
+        <pc:sldMkLst>
+          <pc:docMk/>
+          <pc:sldMk cId="2855184266" sldId="371"/>
+        </pc:sldMkLst>
+        <pc:graphicFrameChg chg="mod modGraphic">
+          <ac:chgData name="Patryk Serafin" userId="86fa742248e137ce" providerId="LiveId" clId="{3298C733-EA56-44BD-B82F-19114443C032}" dt="2024-01-29T18:17:07.354" v="3170" actId="1076"/>
+          <ac:graphicFrameMkLst>
+            <pc:docMk/>
+            <pc:sldMk cId="2855184266" sldId="371"/>
+            <ac:graphicFrameMk id="3" creationId="{5B8A0917-D61B-E7D8-9307-B2F8C561760E}"/>
+          </ac:graphicFrameMkLst>
+        </pc:graphicFrameChg>
+        <pc:graphicFrameChg chg="mod">
+          <ac:chgData name="Patryk Serafin" userId="86fa742248e137ce" providerId="LiveId" clId="{3298C733-EA56-44BD-B82F-19114443C032}" dt="2024-01-29T18:16:59.564" v="3165" actId="1076"/>
+          <ac:graphicFrameMkLst>
+            <pc:docMk/>
+            <pc:sldMk cId="2855184266" sldId="371"/>
+            <ac:graphicFrameMk id="4" creationId="{F7B1645C-2A9A-984F-D0ED-E15087E96E62}"/>
+          </ac:graphicFrameMkLst>
+        </pc:graphicFrameChg>
+        <pc:graphicFrameChg chg="mod">
+          <ac:chgData name="Patryk Serafin" userId="86fa742248e137ce" providerId="LiveId" clId="{3298C733-EA56-44BD-B82F-19114443C032}" dt="2024-01-29T18:16:59.951" v="3166" actId="1076"/>
+          <ac:graphicFrameMkLst>
+            <pc:docMk/>
+            <pc:sldMk cId="2855184266" sldId="371"/>
+            <ac:graphicFrameMk id="5" creationId="{3E508669-E4B8-CC33-69B9-E03AB01409B0}"/>
+          </ac:graphicFrameMkLst>
+        </pc:graphicFrameChg>
+        <pc:graphicFrameChg chg="add mod modGraphic">
+          <ac:chgData name="Patryk Serafin" userId="86fa742248e137ce" providerId="LiveId" clId="{3298C733-EA56-44BD-B82F-19114443C032}" dt="2024-01-29T18:17:14.235" v="3171" actId="1076"/>
+          <ac:graphicFrameMkLst>
+            <pc:docMk/>
+            <pc:sldMk cId="2855184266" sldId="371"/>
+            <ac:graphicFrameMk id="6" creationId="{3F342AB3-3760-37D3-02BC-8EC46B4784FD}"/>
+          </ac:graphicFrameMkLst>
+        </pc:graphicFrameChg>
+      </pc:sldChg>
+      <pc:sldChg chg="delSp modSp add mod setBg delDesignElem">
+        <pc:chgData name="Patryk Serafin" userId="86fa742248e137ce" providerId="LiveId" clId="{3298C733-EA56-44BD-B82F-19114443C032}" dt="2024-01-30T20:42:42.264" v="3181" actId="207"/>
+        <pc:sldMkLst>
+          <pc:docMk/>
+          <pc:sldMk cId="1140178177" sldId="372"/>
+        </pc:sldMkLst>
+        <pc:spChg chg="mod">
+          <ac:chgData name="Patryk Serafin" userId="86fa742248e137ce" providerId="LiveId" clId="{3298C733-EA56-44BD-B82F-19114443C032}" dt="2024-01-30T20:42:42.264" v="3181" actId="207"/>
+          <ac:spMkLst>
+            <pc:docMk/>
+            <pc:sldMk cId="1140178177" sldId="372"/>
+            <ac:spMk id="2" creationId="{DD9B76F6-7E88-5471-4064-6AFC2D6CC2E8}"/>
+          </ac:spMkLst>
+        </pc:spChg>
+        <pc:spChg chg="del">
+          <ac:chgData name="Patryk Serafin" userId="86fa742248e137ce" providerId="LiveId" clId="{3298C733-EA56-44BD-B82F-19114443C032}" dt="2024-01-30T20:42:01.453" v="3173"/>
+          <ac:spMkLst>
+            <pc:docMk/>
+            <pc:sldMk cId="1140178177" sldId="372"/>
+            <ac:spMk id="8" creationId="{310135D4-D3A1-4556-B91B-4A12069D4231}"/>
+          </ac:spMkLst>
+        </pc:spChg>
+        <pc:spChg chg="del">
+          <ac:chgData name="Patryk Serafin" userId="86fa742248e137ce" providerId="LiveId" clId="{3298C733-EA56-44BD-B82F-19114443C032}" dt="2024-01-30T20:42:01.453" v="3173"/>
+          <ac:spMkLst>
+            <pc:docMk/>
+            <pc:sldMk cId="1140178177" sldId="372"/>
+            <ac:spMk id="10" creationId="{A9CCD9CD-49AE-3D3E-923B-81ECD3FBF75F}"/>
+          </ac:spMkLst>
+        </pc:spChg>
+      </pc:sldChg>
+      <pc:sldChg chg="delSp modSp add mod setBg delDesignElem">
+        <pc:chgData name="Patryk Serafin" userId="86fa742248e137ce" providerId="LiveId" clId="{3298C733-EA56-44BD-B82F-19114443C032}" dt="2024-01-30T21:03:14.652" v="3221"/>
+        <pc:sldMkLst>
+          <pc:docMk/>
+          <pc:sldMk cId="1968622345" sldId="373"/>
+        </pc:sldMkLst>
+        <pc:spChg chg="mod">
+          <ac:chgData name="Patryk Serafin" userId="86fa742248e137ce" providerId="LiveId" clId="{3298C733-EA56-44BD-B82F-19114443C032}" dt="2024-01-30T21:03:02.585" v="3220" actId="20577"/>
+          <ac:spMkLst>
+            <pc:docMk/>
+            <pc:sldMk cId="1968622345" sldId="373"/>
+            <ac:spMk id="2" creationId="{0AE5D857-3FF0-8164-6B5D-266F7B555FB8}"/>
+          </ac:spMkLst>
+        </pc:spChg>
+        <pc:spChg chg="mod">
+          <ac:chgData name="Patryk Serafin" userId="86fa742248e137ce" providerId="LiveId" clId="{3298C733-EA56-44BD-B82F-19114443C032}" dt="2024-01-30T21:03:14.652" v="3221"/>
+          <ac:spMkLst>
+            <pc:docMk/>
+            <pc:sldMk cId="1968622345" sldId="373"/>
+            <ac:spMk id="3" creationId="{C9B62D80-9255-C4D4-FD0C-629149E7F4CD}"/>
+          </ac:spMkLst>
+        </pc:spChg>
+        <pc:spChg chg="del">
+          <ac:chgData name="Patryk Serafin" userId="86fa742248e137ce" providerId="LiveId" clId="{3298C733-EA56-44BD-B82F-19114443C032}" dt="2024-01-30T21:02:54.759" v="3194"/>
+          <ac:spMkLst>
+            <pc:docMk/>
+            <pc:sldMk cId="1968622345" sldId="373"/>
+            <ac:spMk id="9" creationId="{92CC1E4F-F1F0-B945-BE50-C72A7103E8AC}"/>
+          </ac:spMkLst>
+        </pc:spChg>
+      </pc:sldChg>
+      <pc:sldChg chg="modSp add del mod">
+        <pc:chgData name="Patryk Serafin" userId="86fa742248e137ce" providerId="LiveId" clId="{3298C733-EA56-44BD-B82F-19114443C032}" dt="2024-01-30T22:25:54.650" v="3823" actId="47"/>
+        <pc:sldMkLst>
+          <pc:docMk/>
+          <pc:sldMk cId="3335532047" sldId="374"/>
+        </pc:sldMkLst>
+        <pc:spChg chg="mod">
+          <ac:chgData name="Patryk Serafin" userId="86fa742248e137ce" providerId="LiveId" clId="{3298C733-EA56-44BD-B82F-19114443C032}" dt="2024-01-30T21:22:46.234" v="3346" actId="20577"/>
+          <ac:spMkLst>
+            <pc:docMk/>
+            <pc:sldMk cId="3335532047" sldId="374"/>
+            <ac:spMk id="2" creationId="{10BE58C5-E636-9AF0-5EAF-780BB6E9363B}"/>
+          </ac:spMkLst>
+        </pc:spChg>
+      </pc:sldChg>
+      <pc:sldChg chg="addSp modSp add del mod">
+        <pc:chgData name="Patryk Serafin" userId="86fa742248e137ce" providerId="LiveId" clId="{3298C733-EA56-44BD-B82F-19114443C032}" dt="2024-01-30T22:26:12.226" v="3826" actId="47"/>
+        <pc:sldMkLst>
+          <pc:docMk/>
+          <pc:sldMk cId="2663681309" sldId="375"/>
+        </pc:sldMkLst>
+        <pc:graphicFrameChg chg="add mod modGraphic">
+          <ac:chgData name="Patryk Serafin" userId="86fa742248e137ce" providerId="LiveId" clId="{3298C733-EA56-44BD-B82F-19114443C032}" dt="2024-01-30T21:24:09.498" v="3356" actId="14100"/>
+          <ac:graphicFrameMkLst>
+            <pc:docMk/>
+            <pc:sldMk cId="2663681309" sldId="375"/>
+            <ac:graphicFrameMk id="4" creationId="{A172358F-C0D4-C927-1A55-39F9F84B694E}"/>
+          </ac:graphicFrameMkLst>
+        </pc:graphicFrameChg>
+        <pc:graphicFrameChg chg="modGraphic">
+          <ac:chgData name="Patryk Serafin" userId="86fa742248e137ce" providerId="LiveId" clId="{3298C733-EA56-44BD-B82F-19114443C032}" dt="2024-01-30T21:24:52.722" v="3375" actId="14100"/>
+          <ac:graphicFrameMkLst>
+            <pc:docMk/>
+            <pc:sldMk cId="2663681309" sldId="375"/>
+            <ac:graphicFrameMk id="6" creationId="{DB2620F9-4637-FFF5-6734-6ADEE6E3807C}"/>
+          </ac:graphicFrameMkLst>
+        </pc:graphicFrameChg>
+      </pc:sldChg>
+      <pc:sldChg chg="modSp add del mod">
+        <pc:chgData name="Patryk Serafin" userId="86fa742248e137ce" providerId="LiveId" clId="{3298C733-EA56-44BD-B82F-19114443C032}" dt="2024-01-30T21:58:47.837" v="3561" actId="47"/>
+        <pc:sldMkLst>
+          <pc:docMk/>
+          <pc:sldMk cId="1375459500" sldId="376"/>
+        </pc:sldMkLst>
+        <pc:spChg chg="mod">
+          <ac:chgData name="Patryk Serafin" userId="86fa742248e137ce" providerId="LiveId" clId="{3298C733-EA56-44BD-B82F-19114443C032}" dt="2024-01-30T21:36:08.661" v="3384" actId="20577"/>
+          <ac:spMkLst>
+            <pc:docMk/>
+            <pc:sldMk cId="1375459500" sldId="376"/>
+            <ac:spMk id="2" creationId="{10BE58C5-E636-9AF0-5EAF-780BB6E9363B}"/>
+          </ac:spMkLst>
+        </pc:spChg>
+        <pc:graphicFrameChg chg="mod modGraphic">
+          <ac:chgData name="Patryk Serafin" userId="86fa742248e137ce" providerId="LiveId" clId="{3298C733-EA56-44BD-B82F-19114443C032}" dt="2024-01-30T21:52:19.361" v="3502" actId="14734"/>
+          <ac:graphicFrameMkLst>
+            <pc:docMk/>
+            <pc:sldMk cId="1375459500" sldId="376"/>
+            <ac:graphicFrameMk id="3" creationId="{5B8A0917-D61B-E7D8-9307-B2F8C561760E}"/>
+          </ac:graphicFrameMkLst>
+        </pc:graphicFrameChg>
+        <pc:graphicFrameChg chg="mod modGraphic">
+          <ac:chgData name="Patryk Serafin" userId="86fa742248e137ce" providerId="LiveId" clId="{3298C733-EA56-44BD-B82F-19114443C032}" dt="2024-01-30T21:42:15.234" v="3462" actId="14100"/>
+          <ac:graphicFrameMkLst>
+            <pc:docMk/>
+            <pc:sldMk cId="1375459500" sldId="376"/>
+            <ac:graphicFrameMk id="4" creationId="{A172358F-C0D4-C927-1A55-39F9F84B694E}"/>
+          </ac:graphicFrameMkLst>
+        </pc:graphicFrameChg>
+        <pc:graphicFrameChg chg="mod modGraphic">
+          <ac:chgData name="Patryk Serafin" userId="86fa742248e137ce" providerId="LiveId" clId="{3298C733-EA56-44BD-B82F-19114443C032}" dt="2024-01-30T21:52:07.211" v="3498" actId="20577"/>
+          <ac:graphicFrameMkLst>
+            <pc:docMk/>
+            <pc:sldMk cId="1375459500" sldId="376"/>
+            <ac:graphicFrameMk id="6" creationId="{DB2620F9-4637-FFF5-6734-6ADEE6E3807C}"/>
+          </ac:graphicFrameMkLst>
+        </pc:graphicFrameChg>
+      </pc:sldChg>
+      <pc:sldChg chg="addSp delSp modSp add mod setBg delDesignElem">
+        <pc:chgData name="Patryk Serafin" userId="86fa742248e137ce" providerId="LiveId" clId="{3298C733-EA56-44BD-B82F-19114443C032}" dt="2024-01-30T22:23:46.794" v="3804"/>
+        <pc:sldMkLst>
+          <pc:docMk/>
+          <pc:sldMk cId="1180631931" sldId="377"/>
+        </pc:sldMkLst>
+        <pc:spChg chg="mod">
+          <ac:chgData name="Patryk Serafin" userId="86fa742248e137ce" providerId="LiveId" clId="{3298C733-EA56-44BD-B82F-19114443C032}" dt="2024-01-30T21:57:00.776" v="3532" actId="26606"/>
+          <ac:spMkLst>
+            <pc:docMk/>
+            <pc:sldMk cId="1180631931" sldId="377"/>
+            <ac:spMk id="2" creationId="{10BE58C5-E636-9AF0-5EAF-780BB6E9363B}"/>
+          </ac:spMkLst>
+        </pc:spChg>
+        <pc:spChg chg="add del">
+          <ac:chgData name="Patryk Serafin" userId="86fa742248e137ce" providerId="LiveId" clId="{3298C733-EA56-44BD-B82F-19114443C032}" dt="2024-01-30T22:16:12.679" v="3587" actId="26606"/>
+          <ac:spMkLst>
+            <pc:docMk/>
+            <pc:sldMk cId="1180631931" sldId="377"/>
+            <ac:spMk id="8" creationId="{9B65F7F7-2FCE-8F01-53DE-15C39342BE99}"/>
+          </ac:spMkLst>
+        </pc:spChg>
+        <pc:spChg chg="add">
+          <ac:chgData name="Patryk Serafin" userId="86fa742248e137ce" providerId="LiveId" clId="{3298C733-EA56-44BD-B82F-19114443C032}" dt="2024-01-30T22:16:12.679" v="3587" actId="26606"/>
+          <ac:spMkLst>
+            <pc:docMk/>
+            <pc:sldMk cId="1180631931" sldId="377"/>
+            <ac:spMk id="13" creationId="{9B65F7F7-2FCE-8F01-53DE-15C39342BE99}"/>
+          </ac:spMkLst>
+        </pc:spChg>
+        <pc:spChg chg="del">
+          <ac:chgData name="Patryk Serafin" userId="86fa742248e137ce" providerId="LiveId" clId="{3298C733-EA56-44BD-B82F-19114443C032}" dt="2024-01-30T21:46:19.339" v="3481"/>
+          <ac:spMkLst>
+            <pc:docMk/>
+            <pc:sldMk cId="1180631931" sldId="377"/>
+            <ac:spMk id="27" creationId="{9B65F7F7-2FCE-8F01-53DE-15C39342BE99}"/>
+          </ac:spMkLst>
+        </pc:spChg>
+        <pc:graphicFrameChg chg="del mod modGraphic">
+          <ac:chgData name="Patryk Serafin" userId="86fa742248e137ce" providerId="LiveId" clId="{3298C733-EA56-44BD-B82F-19114443C032}" dt="2024-01-30T22:23:46.074" v="3803" actId="478"/>
+          <ac:graphicFrameMkLst>
+            <pc:docMk/>
+            <pc:sldMk cId="1180631931" sldId="377"/>
+            <ac:graphicFrameMk id="3" creationId="{5B8A0917-D61B-E7D8-9307-B2F8C561760E}"/>
+          </ac:graphicFrameMkLst>
+        </pc:graphicFrameChg>
+        <pc:graphicFrameChg chg="add mod">
+          <ac:chgData name="Patryk Serafin" userId="86fa742248e137ce" providerId="LiveId" clId="{3298C733-EA56-44BD-B82F-19114443C032}" dt="2024-01-30T22:23:46.794" v="3804"/>
+          <ac:graphicFrameMkLst>
+            <pc:docMk/>
+            <pc:sldMk cId="1180631931" sldId="377"/>
+            <ac:graphicFrameMk id="4" creationId="{8C45715E-FB8D-C18B-21A5-5B447E95821E}"/>
+          </ac:graphicFrameMkLst>
+        </pc:graphicFrameChg>
+      </pc:sldChg>
+      <pc:sldChg chg="addSp delSp modSp add mod setBg delDesignElem">
+        <pc:chgData name="Patryk Serafin" userId="86fa742248e137ce" providerId="LiveId" clId="{3298C733-EA56-44BD-B82F-19114443C032}" dt="2024-01-30T22:25:15.760" v="3821" actId="1076"/>
+        <pc:sldMkLst>
+          <pc:docMk/>
+          <pc:sldMk cId="289399001" sldId="378"/>
+        </pc:sldMkLst>
+        <pc:spChg chg="del">
+          <ac:chgData name="Patryk Serafin" userId="86fa742248e137ce" providerId="LiveId" clId="{3298C733-EA56-44BD-B82F-19114443C032}" dt="2024-01-30T21:58:46.604" v="3560"/>
+          <ac:spMkLst>
+            <pc:docMk/>
+            <pc:sldMk cId="289399001" sldId="378"/>
+            <ac:spMk id="8" creationId="{9B65F7F7-2FCE-8F01-53DE-15C39342BE99}"/>
+          </ac:spMkLst>
+        </pc:spChg>
+        <pc:graphicFrameChg chg="del mod">
+          <ac:chgData name="Patryk Serafin" userId="86fa742248e137ce" providerId="LiveId" clId="{3298C733-EA56-44BD-B82F-19114443C032}" dt="2024-01-30T22:16:23.936" v="3589" actId="478"/>
+          <ac:graphicFrameMkLst>
+            <pc:docMk/>
+            <pc:sldMk cId="289399001" sldId="378"/>
+            <ac:graphicFrameMk id="3" creationId="{5B8A0917-D61B-E7D8-9307-B2F8C561760E}"/>
+          </ac:graphicFrameMkLst>
+        </pc:graphicFrameChg>
+        <pc:graphicFrameChg chg="add mod modGraphic">
+          <ac:chgData name="Patryk Serafin" userId="86fa742248e137ce" providerId="LiveId" clId="{3298C733-EA56-44BD-B82F-19114443C032}" dt="2024-01-30T22:25:15.760" v="3821" actId="1076"/>
+          <ac:graphicFrameMkLst>
+            <pc:docMk/>
+            <pc:sldMk cId="289399001" sldId="378"/>
+            <ac:graphicFrameMk id="4" creationId="{E21AF404-0CF2-9666-75CF-DC6471FA89E2}"/>
+          </ac:graphicFrameMkLst>
+        </pc:graphicFrameChg>
+        <pc:graphicFrameChg chg="add mod modGraphic">
+          <ac:chgData name="Patryk Serafin" userId="86fa742248e137ce" providerId="LiveId" clId="{3298C733-EA56-44BD-B82F-19114443C032}" dt="2024-01-30T22:24:50.904" v="3818" actId="1076"/>
+          <ac:graphicFrameMkLst>
+            <pc:docMk/>
+            <pc:sldMk cId="289399001" sldId="378"/>
+            <ac:graphicFrameMk id="5" creationId="{38AFD5B6-14B2-5406-7B58-8ECF49A7F922}"/>
+          </ac:graphicFrameMkLst>
+        </pc:graphicFrameChg>
+        <pc:graphicFrameChg chg="add del mod">
+          <ac:chgData name="Patryk Serafin" userId="86fa742248e137ce" providerId="LiveId" clId="{3298C733-EA56-44BD-B82F-19114443C032}" dt="2024-01-30T22:16:21.608" v="3588" actId="478"/>
+          <ac:graphicFrameMkLst>
+            <pc:docMk/>
+            <pc:sldMk cId="289399001" sldId="378"/>
+            <ac:graphicFrameMk id="6" creationId="{97B9969B-A7EB-ED03-F0D0-4B7927ABDB7C}"/>
+          </ac:graphicFrameMkLst>
+        </pc:graphicFrameChg>
+        <pc:graphicFrameChg chg="add del mod">
+          <ac:chgData name="Patryk Serafin" userId="86fa742248e137ce" providerId="LiveId" clId="{3298C733-EA56-44BD-B82F-19114443C032}" dt="2024-01-30T22:18:00.379" v="3635" actId="478"/>
+          <ac:graphicFrameMkLst>
+            <pc:docMk/>
+            <pc:sldMk cId="289399001" sldId="378"/>
+            <ac:graphicFrameMk id="7" creationId="{2DCC2F7D-67E1-420E-85BA-CC1CC8DF94B6}"/>
+          </ac:graphicFrameMkLst>
+        </pc:graphicFrameChg>
+        <pc:graphicFrameChg chg="add mod modGraphic">
+          <ac:chgData name="Patryk Serafin" userId="86fa742248e137ce" providerId="LiveId" clId="{3298C733-EA56-44BD-B82F-19114443C032}" dt="2024-01-30T22:24:46.305" v="3817" actId="1076"/>
+          <ac:graphicFrameMkLst>
+            <pc:docMk/>
+            <pc:sldMk cId="289399001" sldId="378"/>
+            <ac:graphicFrameMk id="9" creationId="{1C44935F-5B4E-326B-DEB2-B15BEA812613}"/>
+          </ac:graphicFrameMkLst>
+        </pc:graphicFrameChg>
+      </pc:sldChg>
+      <pc:sldChg chg="modSp add mod">
+        <pc:chgData name="Patryk Serafin" userId="86fa742248e137ce" providerId="LiveId" clId="{3298C733-EA56-44BD-B82F-19114443C032}" dt="2024-01-30T22:25:57.776" v="3824"/>
+        <pc:sldMkLst>
+          <pc:docMk/>
+          <pc:sldMk cId="3037249080" sldId="379"/>
+        </pc:sldMkLst>
+        <pc:spChg chg="mod">
+          <ac:chgData name="Patryk Serafin" userId="86fa742248e137ce" providerId="LiveId" clId="{3298C733-EA56-44BD-B82F-19114443C032}" dt="2024-01-30T22:25:57.776" v="3824"/>
+          <ac:spMkLst>
+            <pc:docMk/>
+            <pc:sldMk cId="3037249080" sldId="379"/>
+            <ac:spMk id="2" creationId="{10BE58C5-E636-9AF0-5EAF-780BB6E9363B}"/>
+          </ac:spMkLst>
+        </pc:spChg>
+      </pc:sldChg>
+      <pc:sldChg chg="addSp modSp add mod">
+        <pc:chgData name="Patryk Serafin" userId="86fa742248e137ce" providerId="LiveId" clId="{3298C733-EA56-44BD-B82F-19114443C032}" dt="2024-01-30T22:28:39.192" v="3895" actId="14100"/>
+        <pc:sldMkLst>
+          <pc:docMk/>
+          <pc:sldMk cId="3265729095" sldId="380"/>
+        </pc:sldMkLst>
+        <pc:graphicFrameChg chg="add mod">
+          <ac:chgData name="Patryk Serafin" userId="86fa742248e137ce" providerId="LiveId" clId="{3298C733-EA56-44BD-B82F-19114443C032}" dt="2024-01-30T22:27:24.498" v="3861" actId="1076"/>
+          <ac:graphicFrameMkLst>
+            <pc:docMk/>
+            <pc:sldMk cId="3265729095" sldId="380"/>
+            <ac:graphicFrameMk id="3" creationId="{804BB04A-735C-F515-8DF4-66EB91280C9A}"/>
+          </ac:graphicFrameMkLst>
+        </pc:graphicFrameChg>
+        <pc:graphicFrameChg chg="mod modGraphic">
+          <ac:chgData name="Patryk Serafin" userId="86fa742248e137ce" providerId="LiveId" clId="{3298C733-EA56-44BD-B82F-19114443C032}" dt="2024-01-30T22:28:21.824" v="3891" actId="14100"/>
+          <ac:graphicFrameMkLst>
+            <pc:docMk/>
+            <pc:sldMk cId="3265729095" sldId="380"/>
+            <ac:graphicFrameMk id="4" creationId="{E21AF404-0CF2-9666-75CF-DC6471FA89E2}"/>
+          </ac:graphicFrameMkLst>
+        </pc:graphicFrameChg>
+        <pc:graphicFrameChg chg="mod modGraphic">
+          <ac:chgData name="Patryk Serafin" userId="86fa742248e137ce" providerId="LiveId" clId="{3298C733-EA56-44BD-B82F-19114443C032}" dt="2024-01-30T22:28:39.192" v="3895" actId="14100"/>
+          <ac:graphicFrameMkLst>
+            <pc:docMk/>
+            <pc:sldMk cId="3265729095" sldId="380"/>
+            <ac:graphicFrameMk id="5" creationId="{38AFD5B6-14B2-5406-7B58-8ECF49A7F922}"/>
+          </ac:graphicFrameMkLst>
+        </pc:graphicFrameChg>
+        <pc:graphicFrameChg chg="mod">
+          <ac:chgData name="Patryk Serafin" userId="86fa742248e137ce" providerId="LiveId" clId="{3298C733-EA56-44BD-B82F-19114443C032}" dt="2024-01-30T22:27:24.498" v="3861" actId="1076"/>
+          <ac:graphicFrameMkLst>
+            <pc:docMk/>
+            <pc:sldMk cId="3265729095" sldId="380"/>
+            <ac:graphicFrameMk id="9" creationId="{1C44935F-5B4E-326B-DEB2-B15BEA812613}"/>
+          </ac:graphicFrameMkLst>
+        </pc:graphicFrameChg>
       </pc:sldChg>
       <pc:sldMasterChg chg="add del addSldLayout delSldLayout">
         <pc:chgData name="Patryk Serafin" userId="86fa742248e137ce" providerId="LiveId" clId="{3298C733-EA56-44BD-B82F-19114443C032}" dt="2024-01-27T10:39:27.326" v="109" actId="26606"/>
@@ -4394,7 +5554,7 @@
           <a:p>
             <a:fld id="{648B3C1D-5755-4177-931D-38D740BDF3D2}" type="datetimeFigureOut">
               <a:rPr lang="pl-PL" smtClean="0"/>
-              <a:t>31.01.2024</a:t>
+              <a:t>04.02.2024</a:t>
             </a:fld>
             <a:endParaRPr lang="pl-PL"/>
           </a:p>
@@ -4814,7 +5974,7 @@
           <a:p>
             <a:fld id="{999A8DD2-C443-44AD-85B3-4CE72B962C5F}" type="datetimeFigureOut">
               <a:rPr lang="en-US" smtClean="0"/>
-              <a:t>1/31/2024</a:t>
+              <a:t>2/4/2024</a:t>
             </a:fld>
             <a:endParaRPr lang="en-US"/>
           </a:p>
@@ -5022,7 +6182,7 @@
           <a:p>
             <a:fld id="{999A8DD2-C443-44AD-85B3-4CE72B962C5F}" type="datetimeFigureOut">
               <a:rPr lang="en-US" smtClean="0"/>
-              <a:t>1/31/2024</a:t>
+              <a:t>2/4/2024</a:t>
             </a:fld>
             <a:endParaRPr lang="en-US"/>
           </a:p>
@@ -5230,7 +6390,7 @@
           <a:p>
             <a:fld id="{999A8DD2-C443-44AD-85B3-4CE72B962C5F}" type="datetimeFigureOut">
               <a:rPr lang="en-US" smtClean="0"/>
-              <a:t>1/31/2024</a:t>
+              <a:t>2/4/2024</a:t>
             </a:fld>
             <a:endParaRPr lang="en-US"/>
           </a:p>
@@ -5428,7 +6588,7 @@
           <a:p>
             <a:fld id="{999A8DD2-C443-44AD-85B3-4CE72B962C5F}" type="datetimeFigureOut">
               <a:rPr lang="en-US" smtClean="0"/>
-              <a:t>1/31/2024</a:t>
+              <a:t>2/4/2024</a:t>
             </a:fld>
             <a:endParaRPr lang="en-US"/>
           </a:p>
@@ -5706,7 +6866,7 @@
           <a:p>
             <a:fld id="{999A8DD2-C443-44AD-85B3-4CE72B962C5F}" type="datetimeFigureOut">
               <a:rPr lang="en-US" smtClean="0"/>
-              <a:t>1/31/2024</a:t>
+              <a:t>2/4/2024</a:t>
             </a:fld>
             <a:endParaRPr lang="en-US"/>
           </a:p>
@@ -5978,7 +7138,7 @@
           <a:p>
             <a:fld id="{999A8DD2-C443-44AD-85B3-4CE72B962C5F}" type="datetimeFigureOut">
               <a:rPr lang="en-US" smtClean="0"/>
-              <a:t>1/31/2024</a:t>
+              <a:t>2/4/2024</a:t>
             </a:fld>
             <a:endParaRPr lang="en-US"/>
           </a:p>
@@ -6402,7 +7562,7 @@
           <a:p>
             <a:fld id="{999A8DD2-C443-44AD-85B3-4CE72B962C5F}" type="datetimeFigureOut">
               <a:rPr lang="en-US" smtClean="0"/>
-              <a:t>1/31/2024</a:t>
+              <a:t>2/4/2024</a:t>
             </a:fld>
             <a:endParaRPr lang="en-US"/>
           </a:p>
@@ -6543,7 +7703,7 @@
           <a:p>
             <a:fld id="{999A8DD2-C443-44AD-85B3-4CE72B962C5F}" type="datetimeFigureOut">
               <a:rPr lang="en-US" smtClean="0"/>
-              <a:t>1/31/2024</a:t>
+              <a:t>2/4/2024</a:t>
             </a:fld>
             <a:endParaRPr lang="en-US"/>
           </a:p>
@@ -6656,7 +7816,7 @@
           <a:p>
             <a:fld id="{999A8DD2-C443-44AD-85B3-4CE72B962C5F}" type="datetimeFigureOut">
               <a:rPr lang="en-US" smtClean="0"/>
-              <a:t>1/31/2024</a:t>
+              <a:t>2/4/2024</a:t>
             </a:fld>
             <a:endParaRPr lang="en-US"/>
           </a:p>
@@ -6975,7 +8135,7 @@
           <a:p>
             <a:fld id="{999A8DD2-C443-44AD-85B3-4CE72B962C5F}" type="datetimeFigureOut">
               <a:rPr lang="en-US" smtClean="0"/>
-              <a:t>1/31/2024</a:t>
+              <a:t>2/4/2024</a:t>
             </a:fld>
             <a:endParaRPr lang="en-US"/>
           </a:p>
@@ -7269,7 +8429,7 @@
           <a:p>
             <a:fld id="{999A8DD2-C443-44AD-85B3-4CE72B962C5F}" type="datetimeFigureOut">
               <a:rPr lang="en-US" smtClean="0"/>
-              <a:t>1/31/2024</a:t>
+              <a:t>2/4/2024</a:t>
             </a:fld>
             <a:endParaRPr lang="en-US"/>
           </a:p>
@@ -7509,7 +8669,7 @@
           <a:p>
             <a:fld id="{999A8DD2-C443-44AD-85B3-4CE72B962C5F}" type="datetimeFigureOut">
               <a:rPr lang="en-US" smtClean="0"/>
-              <a:t>1/31/2024</a:t>
+              <a:t>2/4/2024</a:t>
             </a:fld>
             <a:endParaRPr lang="en-US"/>
           </a:p>
@@ -8277,7 +9437,7 @@
     </p:spTree>
     <p:extLst>
       <p:ext uri="{BB962C8B-B14F-4D97-AF65-F5344CB8AC3E}">
-        <p14:creationId xmlns:p14="http://schemas.microsoft.com/office/powerpoint/2010/main" val="1535528987"/>
+        <p14:creationId xmlns:p14="http://schemas.microsoft.com/office/powerpoint/2010/main" val="1578271858"/>
       </p:ext>
     </p:extLst>
   </p:cSld>
@@ -10568,7 +11728,7 @@
           <a:p>
             <a:r>
               <a:rPr lang="pl-PL" sz="2800" dirty="0"/>
-              <a:t>Podstawowe pojęcia z zakresu BD. Model relacyjny, cechy relacyjnej bazy danych. (2 godziny)</a:t>
+              <a:t>Podstawowe pojęcia z zakresu BD. Model relacyjny, cechy relacyjnej bazy danych.</a:t>
             </a:r>
           </a:p>
         </p:txBody>
@@ -10631,14 +11791,14 @@
           <a:lstStyle/>
           <a:p>
             <a:r>
-              <a:rPr lang="pl-PL" sz="1800"/>
-              <a:t>Godzina 1: Wprowadzenie do baz danych, definicja modelu relacyjnego.</a:t>
-            </a:r>
-          </a:p>
-          <a:p>
-            <a:r>
-              <a:rPr lang="pl-PL" sz="1800"/>
-              <a:t>Godzina 2: Charakterystyka i cechy relacyjnych baz danych.</a:t>
+              <a:rPr lang="pl-PL" sz="1800" dirty="0"/>
+              <a:t>Wprowadzenie do baz danych, definicja modelu relacyjnego.</a:t>
+            </a:r>
+          </a:p>
+          <a:p>
+            <a:r>
+              <a:rPr lang="pl-PL" sz="1800" dirty="0"/>
+              <a:t>Charakterystyka i cechy relacyjnych baz danych.</a:t>
             </a:r>
           </a:p>
         </p:txBody>
@@ -10898,23 +12058,7 @@
           <a:lstStyle/>
           <a:p>
             <a:r>
-              <a:rPr lang="en-US" sz="4000">
-                <a:solidFill>
-                  <a:srgbClr val="FFFFFF"/>
-                </a:solidFill>
-              </a:rPr>
-              <a:t>Godzina</a:t>
-            </a:r>
-            <a:r>
-              <a:rPr lang="en-US" sz="4000" dirty="0">
-                <a:solidFill>
-                  <a:srgbClr val="FFFFFF"/>
-                </a:solidFill>
-              </a:rPr>
-              <a:t> 1: </a:t>
-            </a:r>
-            <a:r>
-              <a:rPr lang="en-US" sz="4000">
+              <a:rPr lang="en-US" sz="4000" dirty="0" err="1">
                 <a:solidFill>
                   <a:srgbClr val="FFFFFF"/>
                 </a:solidFill>
@@ -10930,7 +12074,7 @@
               <a:t> do </a:t>
             </a:r>
             <a:r>
-              <a:rPr lang="en-US" sz="4000">
+              <a:rPr lang="en-US" sz="4000" dirty="0" err="1">
                 <a:solidFill>
                   <a:srgbClr val="FFFFFF"/>
                 </a:solidFill>
@@ -10946,7 +12090,7 @@
               <a:t> </a:t>
             </a:r>
             <a:r>
-              <a:rPr lang="en-US" sz="4000">
+              <a:rPr lang="en-US" sz="4000" dirty="0" err="1">
                 <a:solidFill>
                   <a:srgbClr val="FFFFFF"/>
                 </a:solidFill>
@@ -10962,7 +12106,7 @@
               <a:t> </a:t>
             </a:r>
             <a:r>
-              <a:rPr lang="en-US" sz="4000">
+              <a:rPr lang="en-US" sz="4000" dirty="0" err="1">
                 <a:solidFill>
                   <a:srgbClr val="FFFFFF"/>
                 </a:solidFill>
@@ -10978,7 +12122,7 @@
               <a:t> </a:t>
             </a:r>
             <a:r>
-              <a:rPr lang="en-US" sz="4000">
+              <a:rPr lang="en-US" sz="4000" dirty="0" err="1">
                 <a:solidFill>
                   <a:srgbClr val="FFFFFF"/>
                 </a:solidFill>
@@ -10994,13 +12138,18 @@
               <a:t> </a:t>
             </a:r>
             <a:r>
-              <a:rPr lang="en-US" sz="4000">
+              <a:rPr lang="en-US" sz="4000" dirty="0" err="1">
                 <a:solidFill>
                   <a:srgbClr val="FFFFFF"/>
                 </a:solidFill>
               </a:rPr>
               <a:t>relacyjnego</a:t>
             </a:r>
+            <a:endParaRPr lang="en-US" sz="4000" dirty="0">
+              <a:solidFill>
+                <a:srgbClr val="FFFFFF"/>
+              </a:solidFill>
+            </a:endParaRPr>
           </a:p>
         </p:txBody>
       </p:sp>
@@ -12833,12 +13982,92 @@
           <a:p>
             <a:pPr algn="ctr"/>
             <a:r>
-              <a:rPr lang="en-US" sz="4000">
+              <a:rPr lang="en-US" sz="4000" dirty="0" err="1">
                 <a:solidFill>
                   <a:srgbClr val="FFFFFF"/>
                 </a:solidFill>
               </a:rPr>
-              <a:t>Godzina 2: Charakterystyka i cechy relacyjnych baz danych</a:t>
+              <a:t>Charakterystyka</a:t>
+            </a:r>
+            <a:r>
+              <a:rPr lang="en-US" sz="4000" dirty="0">
+                <a:solidFill>
+                  <a:srgbClr val="FFFFFF"/>
+                </a:solidFill>
+              </a:rPr>
+              <a:t> </a:t>
+            </a:r>
+            <a:r>
+              <a:rPr lang="en-US" sz="4000" dirty="0" err="1">
+                <a:solidFill>
+                  <a:srgbClr val="FFFFFF"/>
+                </a:solidFill>
+              </a:rPr>
+              <a:t>i</a:t>
+            </a:r>
+            <a:r>
+              <a:rPr lang="en-US" sz="4000" dirty="0">
+                <a:solidFill>
+                  <a:srgbClr val="FFFFFF"/>
+                </a:solidFill>
+              </a:rPr>
+              <a:t> </a:t>
+            </a:r>
+            <a:r>
+              <a:rPr lang="en-US" sz="4000" dirty="0" err="1">
+                <a:solidFill>
+                  <a:srgbClr val="FFFFFF"/>
+                </a:solidFill>
+              </a:rPr>
+              <a:t>cechy</a:t>
+            </a:r>
+            <a:r>
+              <a:rPr lang="en-US" sz="4000" dirty="0">
+                <a:solidFill>
+                  <a:srgbClr val="FFFFFF"/>
+                </a:solidFill>
+              </a:rPr>
+              <a:t> </a:t>
+            </a:r>
+            <a:r>
+              <a:rPr lang="en-US" sz="4000" dirty="0" err="1">
+                <a:solidFill>
+                  <a:srgbClr val="FFFFFF"/>
+                </a:solidFill>
+              </a:rPr>
+              <a:t>relacyjnych</a:t>
+            </a:r>
+            <a:r>
+              <a:rPr lang="en-US" sz="4000" dirty="0">
+                <a:solidFill>
+                  <a:srgbClr val="FFFFFF"/>
+                </a:solidFill>
+              </a:rPr>
+              <a:t> </a:t>
+            </a:r>
+            <a:r>
+              <a:rPr lang="en-US" sz="4000" dirty="0" err="1">
+                <a:solidFill>
+                  <a:srgbClr val="FFFFFF"/>
+                </a:solidFill>
+              </a:rPr>
+              <a:t>baz</a:t>
+            </a:r>
+            <a:r>
+              <a:rPr lang="en-US" sz="4000" dirty="0">
+                <a:solidFill>
+                  <a:srgbClr val="FFFFFF"/>
+                </a:solidFill>
+              </a:rPr>
+              <a:t> </a:t>
+            </a:r>
+            <a:r>
+              <a:rPr lang="en-US" sz="4000" dirty="0" err="1">
+                <a:solidFill>
+                  <a:srgbClr val="FFFFFF"/>
+                </a:solidFill>
+              </a:rPr>
+              <a:t>danych</a:t>
             </a:r>
             <a:endParaRPr lang="en-US" sz="4000" dirty="0">
               <a:solidFill>

</xml_diff>

<commit_message>
Modify files in WWW
</commit_message>
<xml_diff>
--- a/subjects/WWW/Bazy danych - 1 zajęcia.pptx
+++ b/subjects/WWW/Bazy danych - 1 zajęcia.pptx
@@ -5,7 +5,7 @@
     <p:sldMasterId id="2147483720" r:id="rId1"/>
   </p:sldMasterIdLst>
   <p:notesMasterIdLst>
-    <p:notesMasterId r:id="rId16"/>
+    <p:notesMasterId r:id="rId15"/>
   </p:notesMasterIdLst>
   <p:sldIdLst>
     <p:sldId id="381" r:id="rId2"/>
@@ -21,7 +21,6 @@
     <p:sldId id="353" r:id="rId12"/>
     <p:sldId id="355" r:id="rId13"/>
     <p:sldId id="347" r:id="rId14"/>
-    <p:sldId id="356" r:id="rId15"/>
   </p:sldIdLst>
   <p:sldSz cx="12192000" cy="6858000"/>
   <p:notesSz cx="6858000" cy="9144000"/>
@@ -5469,6 +5468,22 @@
       </pc:sldMasterChg>
     </pc:docChg>
   </pc:docChgLst>
+  <pc:docChgLst>
+    <pc:chgData name="Serafin Patryk" userId="ce8cf8d3-b140-43f7-9541-10745587815e" providerId="ADAL" clId="{DF36585D-524B-4679-B46D-21A04DCF61B4}"/>
+    <pc:docChg chg="delSld">
+      <pc:chgData name="Serafin Patryk" userId="ce8cf8d3-b140-43f7-9541-10745587815e" providerId="ADAL" clId="{DF36585D-524B-4679-B46D-21A04DCF61B4}" dt="2024-03-06T09:02:48.429" v="0" actId="47"/>
+      <pc:docMkLst>
+        <pc:docMk/>
+      </pc:docMkLst>
+      <pc:sldChg chg="del">
+        <pc:chgData name="Serafin Patryk" userId="ce8cf8d3-b140-43f7-9541-10745587815e" providerId="ADAL" clId="{DF36585D-524B-4679-B46D-21A04DCF61B4}" dt="2024-03-06T09:02:48.429" v="0" actId="47"/>
+        <pc:sldMkLst>
+          <pc:docMk/>
+          <pc:sldMk cId="2938863905" sldId="356"/>
+        </pc:sldMkLst>
+      </pc:sldChg>
+    </pc:docChg>
+  </pc:docChgLst>
 </pc:chgInfo>
 </file>
 
@@ -5554,7 +5569,7 @@
           <a:p>
             <a:fld id="{648B3C1D-5755-4177-931D-38D740BDF3D2}" type="datetimeFigureOut">
               <a:rPr lang="pl-PL" smtClean="0"/>
-              <a:t>04.02.2024</a:t>
+              <a:t>06.03.2024</a:t>
             </a:fld>
             <a:endParaRPr lang="pl-PL"/>
           </a:p>
@@ -5974,7 +5989,7 @@
           <a:p>
             <a:fld id="{999A8DD2-C443-44AD-85B3-4CE72B962C5F}" type="datetimeFigureOut">
               <a:rPr lang="en-US" smtClean="0"/>
-              <a:t>2/4/2024</a:t>
+              <a:t>3/6/2024</a:t>
             </a:fld>
             <a:endParaRPr lang="en-US"/>
           </a:p>
@@ -6182,7 +6197,7 @@
           <a:p>
             <a:fld id="{999A8DD2-C443-44AD-85B3-4CE72B962C5F}" type="datetimeFigureOut">
               <a:rPr lang="en-US" smtClean="0"/>
-              <a:t>2/4/2024</a:t>
+              <a:t>3/6/2024</a:t>
             </a:fld>
             <a:endParaRPr lang="en-US"/>
           </a:p>
@@ -6390,7 +6405,7 @@
           <a:p>
             <a:fld id="{999A8DD2-C443-44AD-85B3-4CE72B962C5F}" type="datetimeFigureOut">
               <a:rPr lang="en-US" smtClean="0"/>
-              <a:t>2/4/2024</a:t>
+              <a:t>3/6/2024</a:t>
             </a:fld>
             <a:endParaRPr lang="en-US"/>
           </a:p>
@@ -6588,7 +6603,7 @@
           <a:p>
             <a:fld id="{999A8DD2-C443-44AD-85B3-4CE72B962C5F}" type="datetimeFigureOut">
               <a:rPr lang="en-US" smtClean="0"/>
-              <a:t>2/4/2024</a:t>
+              <a:t>3/6/2024</a:t>
             </a:fld>
             <a:endParaRPr lang="en-US"/>
           </a:p>
@@ -6866,7 +6881,7 @@
           <a:p>
             <a:fld id="{999A8DD2-C443-44AD-85B3-4CE72B962C5F}" type="datetimeFigureOut">
               <a:rPr lang="en-US" smtClean="0"/>
-              <a:t>2/4/2024</a:t>
+              <a:t>3/6/2024</a:t>
             </a:fld>
             <a:endParaRPr lang="en-US"/>
           </a:p>
@@ -7138,7 +7153,7 @@
           <a:p>
             <a:fld id="{999A8DD2-C443-44AD-85B3-4CE72B962C5F}" type="datetimeFigureOut">
               <a:rPr lang="en-US" smtClean="0"/>
-              <a:t>2/4/2024</a:t>
+              <a:t>3/6/2024</a:t>
             </a:fld>
             <a:endParaRPr lang="en-US"/>
           </a:p>
@@ -7562,7 +7577,7 @@
           <a:p>
             <a:fld id="{999A8DD2-C443-44AD-85B3-4CE72B962C5F}" type="datetimeFigureOut">
               <a:rPr lang="en-US" smtClean="0"/>
-              <a:t>2/4/2024</a:t>
+              <a:t>3/6/2024</a:t>
             </a:fld>
             <a:endParaRPr lang="en-US"/>
           </a:p>
@@ -7703,7 +7718,7 @@
           <a:p>
             <a:fld id="{999A8DD2-C443-44AD-85B3-4CE72B962C5F}" type="datetimeFigureOut">
               <a:rPr lang="en-US" smtClean="0"/>
-              <a:t>2/4/2024</a:t>
+              <a:t>3/6/2024</a:t>
             </a:fld>
             <a:endParaRPr lang="en-US"/>
           </a:p>
@@ -7816,7 +7831,7 @@
           <a:p>
             <a:fld id="{999A8DD2-C443-44AD-85B3-4CE72B962C5F}" type="datetimeFigureOut">
               <a:rPr lang="en-US" smtClean="0"/>
-              <a:t>2/4/2024</a:t>
+              <a:t>3/6/2024</a:t>
             </a:fld>
             <a:endParaRPr lang="en-US"/>
           </a:p>
@@ -8135,7 +8150,7 @@
           <a:p>
             <a:fld id="{999A8DD2-C443-44AD-85B3-4CE72B962C5F}" type="datetimeFigureOut">
               <a:rPr lang="en-US" smtClean="0"/>
-              <a:t>2/4/2024</a:t>
+              <a:t>3/6/2024</a:t>
             </a:fld>
             <a:endParaRPr lang="en-US"/>
           </a:p>
@@ -8429,7 +8444,7 @@
           <a:p>
             <a:fld id="{999A8DD2-C443-44AD-85B3-4CE72B962C5F}" type="datetimeFigureOut">
               <a:rPr lang="en-US" smtClean="0"/>
-              <a:t>2/4/2024</a:t>
+              <a:t>3/6/2024</a:t>
             </a:fld>
             <a:endParaRPr lang="en-US"/>
           </a:p>
@@ -8669,7 +8684,7 @@
           <a:p>
             <a:fld id="{999A8DD2-C443-44AD-85B3-4CE72B962C5F}" type="datetimeFigureOut">
               <a:rPr lang="en-US" smtClean="0"/>
-              <a:t>2/4/2024</a:t>
+              <a:t>3/6/2024</a:t>
             </a:fld>
             <a:endParaRPr lang="en-US"/>
           </a:p>
@@ -11263,328 +11278,6 @@
     <p:extLst>
       <p:ext uri="{BB962C8B-B14F-4D97-AF65-F5344CB8AC3E}">
         <p14:creationId xmlns:p14="http://schemas.microsoft.com/office/powerpoint/2010/main" val="4210460240"/>
-      </p:ext>
-    </p:extLst>
-  </p:cSld>
-  <p:clrMapOvr>
-    <a:masterClrMapping/>
-  </p:clrMapOvr>
-</p:sld>
-</file>
-
-<file path=ppt/slides/slide14.xml><?xml version="1.0" encoding="utf-8"?>
-<p:sld xmlns:a="http://schemas.openxmlformats.org/drawingml/2006/main" xmlns:r="http://schemas.openxmlformats.org/officeDocument/2006/relationships" xmlns:p="http://schemas.openxmlformats.org/presentationml/2006/main">
-  <p:cSld>
-    <p:bg>
-      <p:bgPr>
-        <a:solidFill>
-          <a:schemeClr val="bg1"/>
-        </a:solidFill>
-        <a:effectLst/>
-      </p:bgPr>
-    </p:bg>
-    <p:spTree>
-      <p:nvGrpSpPr>
-        <p:cNvPr id="1" name=""/>
-        <p:cNvGrpSpPr/>
-        <p:nvPr/>
-      </p:nvGrpSpPr>
-      <p:grpSpPr>
-        <a:xfrm>
-          <a:off x="0" y="0"/>
-          <a:ext cx="0" cy="0"/>
-          <a:chOff x="0" y="0"/>
-          <a:chExt cx="0" cy="0"/>
-        </a:xfrm>
-      </p:grpSpPr>
-      <p:sp>
-        <p:nvSpPr>
-          <p:cNvPr id="8" name="Rectangle 7">
-            <a:extLst>
-              <a:ext uri="{FF2B5EF4-FFF2-40B4-BE49-F238E27FC236}">
-                <a16:creationId xmlns:a16="http://schemas.microsoft.com/office/drawing/2014/main" id="{310135D4-D3A1-4556-B91B-4A12069D4231}"/>
-              </a:ext>
-              <a:ext uri="{C183D7F6-B498-43B3-948B-1728B52AA6E4}">
-                <adec:decorative xmlns:adec="http://schemas.microsoft.com/office/drawing/2017/decorative" val="1"/>
-              </a:ext>
-            </a:extLst>
-          </p:cNvPr>
-          <p:cNvSpPr>
-            <a:spLocks noGrp="1" noRot="1" noChangeAspect="1" noMove="1" noResize="1" noEditPoints="1" noAdjustHandles="1" noChangeArrowheads="1" noChangeShapeType="1" noTextEdit="1"/>
-          </p:cNvSpPr>
-          <p:nvPr>
-            <p:extLst>
-              <p:ext uri="{386F3935-93C4-4BCD-93E2-E3B085C9AB24}">
-                <p16:designElem xmlns:p16="http://schemas.microsoft.com/office/powerpoint/2015/main" val="1"/>
-              </p:ext>
-            </p:extLst>
-          </p:nvPr>
-        </p:nvSpPr>
-        <p:spPr>
-          <a:xfrm>
-            <a:off x="0" y="0"/>
-            <a:ext cx="12192000" cy="6858000"/>
-          </a:xfrm>
-          <a:prstGeom prst="rect">
-            <a:avLst/>
-          </a:prstGeom>
-          <a:solidFill>
-            <a:schemeClr val="bg1"/>
-          </a:solidFill>
-          <a:ln w="12700" cap="flat" cmpd="sng" algn="ctr">
-            <a:noFill/>
-            <a:prstDash val="solid"/>
-            <a:miter lim="800000"/>
-          </a:ln>
-          <a:effectLst/>
-          <a:extLst>
-            <a:ext uri="{91240B29-F687-4F45-9708-019B960494DF}">
-              <a14:hiddenLine xmlns:a14="http://schemas.microsoft.com/office/drawing/2010/main" w="12700" cap="flat" cmpd="sng" algn="ctr">
-                <a:solidFill>
-                  <a:schemeClr val="accent1">
-                    <a:shade val="15000"/>
-                  </a:schemeClr>
-                </a:solidFill>
-                <a:prstDash val="solid"/>
-                <a:miter lim="800000"/>
-              </a14:hiddenLine>
-            </a:ext>
-          </a:extLst>
-        </p:spPr>
-        <p:style>
-          <a:lnRef idx="2">
-            <a:schemeClr val="accent1">
-              <a:shade val="15000"/>
-            </a:schemeClr>
-          </a:lnRef>
-          <a:fillRef idx="1">
-            <a:schemeClr val="accent1"/>
-          </a:fillRef>
-          <a:effectRef idx="0">
-            <a:schemeClr val="accent1"/>
-          </a:effectRef>
-          <a:fontRef idx="minor">
-            <a:schemeClr val="lt1"/>
-          </a:fontRef>
-        </p:style>
-        <p:txBody>
-          <a:bodyPr rtlCol="0" anchor="ctr"/>
-          <a:lstStyle/>
-          <a:p>
-            <a:pPr algn="ctr"/>
-            <a:endParaRPr lang="en-US"/>
-          </a:p>
-        </p:txBody>
-      </p:sp>
-      <p:pic>
-        <p:nvPicPr>
-          <p:cNvPr id="4" name="Picture 3" descr="Okulary na wierzchu książki">
-            <a:extLst>
-              <a:ext uri="{FF2B5EF4-FFF2-40B4-BE49-F238E27FC236}">
-                <a16:creationId xmlns:a16="http://schemas.microsoft.com/office/drawing/2014/main" id="{B6B93A28-5D41-43C6-B15E-E06B4CC5DA95}"/>
-              </a:ext>
-            </a:extLst>
-          </p:cNvPr>
-          <p:cNvPicPr>
-            <a:picLocks noChangeAspect="1"/>
-          </p:cNvPicPr>
-          <p:nvPr/>
-        </p:nvPicPr>
-        <p:blipFill rotWithShape="1">
-          <a:blip r:embed="rId2"/>
-          <a:srcRect t="14112" b="983"/>
-          <a:stretch/>
-        </p:blipFill>
-        <p:spPr>
-          <a:xfrm>
-            <a:off x="20" y="-1"/>
-            <a:ext cx="12191980" cy="6858001"/>
-          </a:xfrm>
-          <a:prstGeom prst="rect">
-            <a:avLst/>
-          </a:prstGeom>
-        </p:spPr>
-      </p:pic>
-      <p:sp>
-        <p:nvSpPr>
-          <p:cNvPr id="10" name="Rectangle 9">
-            <a:extLst>
-              <a:ext uri="{FF2B5EF4-FFF2-40B4-BE49-F238E27FC236}">
-                <a16:creationId xmlns:a16="http://schemas.microsoft.com/office/drawing/2014/main" id="{A9CCD9CD-49AE-3D3E-923B-81ECD3FBF75F}"/>
-              </a:ext>
-              <a:ext uri="{C183D7F6-B498-43B3-948B-1728B52AA6E4}">
-                <adec:decorative xmlns:adec="http://schemas.microsoft.com/office/drawing/2017/decorative" val="1"/>
-              </a:ext>
-            </a:extLst>
-          </p:cNvPr>
-          <p:cNvSpPr>
-            <a:spLocks noGrp="1" noRot="1" noChangeAspect="1" noMove="1" noResize="1" noEditPoints="1" noAdjustHandles="1" noChangeArrowheads="1" noChangeShapeType="1" noTextEdit="1"/>
-          </p:cNvSpPr>
-          <p:nvPr>
-            <p:extLst>
-              <p:ext uri="{386F3935-93C4-4BCD-93E2-E3B085C9AB24}">
-                <p16:designElem xmlns:p16="http://schemas.microsoft.com/office/powerpoint/2015/main" val="1"/>
-              </p:ext>
-            </p:extLst>
-          </p:nvPr>
-        </p:nvSpPr>
-        <p:spPr>
-          <a:xfrm rot="5400000">
-            <a:off x="752015" y="-752015"/>
-            <a:ext cx="6858000" cy="8362030"/>
-          </a:xfrm>
-          <a:prstGeom prst="rect">
-            <a:avLst/>
-          </a:prstGeom>
-          <a:gradFill>
-            <a:gsLst>
-              <a:gs pos="0">
-                <a:srgbClr val="000000">
-                  <a:alpha val="0"/>
-                </a:srgbClr>
-              </a:gs>
-              <a:gs pos="55000">
-                <a:srgbClr val="000000">
-                  <a:alpha val="50000"/>
-                </a:srgbClr>
-              </a:gs>
-              <a:gs pos="100000">
-                <a:srgbClr val="000000">
-                  <a:alpha val="60000"/>
-                </a:srgbClr>
-              </a:gs>
-            </a:gsLst>
-            <a:lin ang="5400000" scaled="1"/>
-          </a:gradFill>
-          <a:ln>
-            <a:noFill/>
-          </a:ln>
-        </p:spPr>
-        <p:style>
-          <a:lnRef idx="2">
-            <a:schemeClr val="accent1">
-              <a:shade val="50000"/>
-            </a:schemeClr>
-          </a:lnRef>
-          <a:fillRef idx="1">
-            <a:schemeClr val="accent1"/>
-          </a:fillRef>
-          <a:effectRef idx="0">
-            <a:schemeClr val="accent1"/>
-          </a:effectRef>
-          <a:fontRef idx="minor">
-            <a:schemeClr val="lt1"/>
-          </a:fontRef>
-        </p:style>
-        <p:txBody>
-          <a:bodyPr rtlCol="0" anchor="ctr"/>
-          <a:lstStyle/>
-          <a:p>
-            <a:pPr algn="ctr"/>
-            <a:endParaRPr lang="en-US"/>
-          </a:p>
-        </p:txBody>
-      </p:sp>
-      <p:sp>
-        <p:nvSpPr>
-          <p:cNvPr id="2" name="Tytuł 1">
-            <a:extLst>
-              <a:ext uri="{FF2B5EF4-FFF2-40B4-BE49-F238E27FC236}">
-                <a16:creationId xmlns:a16="http://schemas.microsoft.com/office/drawing/2014/main" id="{DD9B76F6-7E88-5471-4064-6AFC2D6CC2E8}"/>
-              </a:ext>
-            </a:extLst>
-          </p:cNvPr>
-          <p:cNvSpPr>
-            <a:spLocks noGrp="1"/>
-          </p:cNvSpPr>
-          <p:nvPr>
-            <p:ph type="title"/>
-          </p:nvPr>
-        </p:nvSpPr>
-        <p:spPr>
-          <a:xfrm>
-            <a:off x="626918" y="3429000"/>
-            <a:ext cx="4506064" cy="1888742"/>
-          </a:xfrm>
-        </p:spPr>
-        <p:txBody>
-          <a:bodyPr vert="horz" lIns="91440" tIns="45720" rIns="91440" bIns="45720" rtlCol="0" anchor="b">
-            <a:normAutofit/>
-          </a:bodyPr>
-          <a:lstStyle/>
-          <a:p>
-            <a:r>
-              <a:rPr lang="en-US" sz="4000" dirty="0" err="1">
-                <a:solidFill>
-                  <a:srgbClr val="FFFFFF"/>
-                </a:solidFill>
-                <a:hlinkClick r:id="rId3">
-                  <a:extLst>
-                    <a:ext uri="{A12FA001-AC4F-418D-AE19-62706E023703}">
-                      <ahyp:hlinkClr xmlns:ahyp="http://schemas.microsoft.com/office/drawing/2018/hyperlinkcolor" val="tx"/>
-                    </a:ext>
-                  </a:extLst>
-                </a:hlinkClick>
-              </a:rPr>
-              <a:t>Sprawdź</a:t>
-            </a:r>
-            <a:r>
-              <a:rPr lang="en-US" sz="4000" dirty="0">
-                <a:solidFill>
-                  <a:srgbClr val="FFFFFF"/>
-                </a:solidFill>
-                <a:hlinkClick r:id="rId3">
-                  <a:extLst>
-                    <a:ext uri="{A12FA001-AC4F-418D-AE19-62706E023703}">
-                      <ahyp:hlinkClr xmlns:ahyp="http://schemas.microsoft.com/office/drawing/2018/hyperlinkcolor" val="tx"/>
-                    </a:ext>
-                  </a:extLst>
-                </a:hlinkClick>
-              </a:rPr>
-              <a:t> </a:t>
-            </a:r>
-            <a:r>
-              <a:rPr lang="en-US" sz="4000" dirty="0" err="1">
-                <a:solidFill>
-                  <a:srgbClr val="FFFFFF"/>
-                </a:solidFill>
-                <a:hlinkClick r:id="rId3">
-                  <a:extLst>
-                    <a:ext uri="{A12FA001-AC4F-418D-AE19-62706E023703}">
-                      <ahyp:hlinkClr xmlns:ahyp="http://schemas.microsoft.com/office/drawing/2018/hyperlinkcolor" val="tx"/>
-                    </a:ext>
-                  </a:extLst>
-                </a:hlinkClick>
-              </a:rPr>
-              <a:t>siebie</a:t>
-            </a:r>
-            <a:r>
-              <a:rPr lang="en-US" sz="4000" dirty="0">
-                <a:solidFill>
-                  <a:srgbClr val="FFFFFF"/>
-                </a:solidFill>
-                <a:hlinkClick r:id="rId3">
-                  <a:extLst>
-                    <a:ext uri="{A12FA001-AC4F-418D-AE19-62706E023703}">
-                      <ahyp:hlinkClr xmlns:ahyp="http://schemas.microsoft.com/office/drawing/2018/hyperlinkcolor" val="tx"/>
-                    </a:ext>
-                  </a:extLst>
-                </a:hlinkClick>
-              </a:rPr>
-              <a:t>!</a:t>
-            </a:r>
-            <a:endParaRPr lang="en-US" sz="4000" dirty="0">
-              <a:solidFill>
-                <a:srgbClr val="FFFFFF"/>
-              </a:solidFill>
-            </a:endParaRPr>
-          </a:p>
-        </p:txBody>
-      </p:sp>
-    </p:spTree>
-    <p:extLst>
-      <p:ext uri="{BB962C8B-B14F-4D97-AF65-F5344CB8AC3E}">
-        <p14:creationId xmlns:p14="http://schemas.microsoft.com/office/powerpoint/2010/main" val="2938863905"/>
       </p:ext>
     </p:extLst>
   </p:cSld>

</xml_diff>